<commit_message>
Update Plantilla - Social Cultura y deporte.pptx
</commit_message>
<xml_diff>
--- a/Plantilla - Social Cultura y deporte.pptx
+++ b/Plantilla - Social Cultura y deporte.pptx
@@ -5164,14 +5164,14 @@
           <p:nvPr>
             <p:extLst>
               <p:ext uri="{D42A27DB-BD31-4B8C-83A1-F6EECF244321}">
-                <p14:modId xmlns:p14="http://schemas.microsoft.com/office/powerpoint/2010/main" val="2489346824"/>
+                <p14:modId xmlns:p14="http://schemas.microsoft.com/office/powerpoint/2010/main" val="219814643"/>
               </p:ext>
             </p:extLst>
           </p:nvPr>
         </p:nvGraphicFramePr>
         <p:xfrm>
           <a:off x="326333" y="1501531"/>
-          <a:ext cx="11539334" cy="4944532"/>
+          <a:ext cx="9873372" cy="1792448"/>
         </p:xfrm>
         <a:graphic>
           <a:graphicData uri="http://schemas.openxmlformats.org/drawingml/2006/table">
@@ -5194,13 +5194,6 @@
                     </a:ext>
                   </a:extLst>
                 </a:gridCol>
-                <a:gridCol w="901874">
-                  <a:extLst>
-                    <a:ext uri="{9D8B030D-6E8A-4147-A177-3AD203B41FA5}">
-                      <a16:colId xmlns:a16="http://schemas.microsoft.com/office/drawing/2014/main" val="666123856"/>
-                    </a:ext>
-                  </a:extLst>
-                </a:gridCol>
                 <a:gridCol w="3444658">
                   <a:extLst>
                     <a:ext uri="{9D8B030D-6E8A-4147-A177-3AD203B41FA5}">
@@ -5219,13 +5212,6 @@
                   <a:extLst>
                     <a:ext uri="{9D8B030D-6E8A-4147-A177-3AD203B41FA5}">
                       <a16:colId xmlns:a16="http://schemas.microsoft.com/office/drawing/2014/main" val="3816031137"/>
-                    </a:ext>
-                  </a:extLst>
-                </a:gridCol>
-                <a:gridCol w="764088">
-                  <a:extLst>
-                    <a:ext uri="{9D8B030D-6E8A-4147-A177-3AD203B41FA5}">
-                      <a16:colId xmlns:a16="http://schemas.microsoft.com/office/drawing/2014/main" val="3827666896"/>
                     </a:ext>
                   </a:extLst>
                 </a:gridCol>
@@ -5283,33 +5269,6 @@
                           <a:effectLst/>
                         </a:rPr>
                         <a:t>CUI</a:t>
-                      </a:r>
-                      <a:endParaRPr lang="es-PE" sz="1200" b="1" i="0" u="none" strike="noStrike" dirty="0">
-                        <a:solidFill>
-                          <a:srgbClr val="000000"/>
-                        </a:solidFill>
-                        <a:effectLst/>
-                        <a:latin typeface="Arial Narrow" panose="020B0606020202030204" pitchFamily="34" charset="0"/>
-                      </a:endParaRPr>
-                    </a:p>
-                  </a:txBody>
-                  <a:tcPr marL="6772" marR="6772" marT="6772" marB="0" anchor="ctr">
-                    <a:solidFill>
-                      <a:schemeClr val="accent5"/>
-                    </a:solidFill>
-                  </a:tcPr>
-                </a:tc>
-                <a:tc>
-                  <a:txBody>
-                    <a:bodyPr/>
-                    <a:lstStyle/>
-                    <a:p>
-                      <a:pPr algn="ctr" rtl="0" fontAlgn="ctr"/>
-                      <a:r>
-                        <a:rPr lang="es-PE" sz="1200" b="1" u="none" strike="noStrike" dirty="0">
-                          <a:effectLst/>
-                        </a:rPr>
-                        <a:t>CÓDIGO DE IDEA</a:t>
                       </a:r>
                       <a:endParaRPr lang="es-PE" sz="1200" b="1" i="0" u="none" strike="noStrike" dirty="0">
                         <a:solidFill>
@@ -5414,30 +5373,6 @@
                     <a:p>
                       <a:pPr algn="ctr" rtl="0" fontAlgn="ctr"/>
                       <a:r>
-                        <a:rPr lang="es-PE" sz="1200" b="1" i="0" u="none" strike="noStrike" dirty="0">
-                          <a:solidFill>
-                            <a:srgbClr val="000000"/>
-                          </a:solidFill>
-                          <a:effectLst/>
-                          <a:latin typeface="Arial Narrow" panose="020B0606020202030204" pitchFamily="34" charset="0"/>
-                        </a:rPr>
-                        <a:t>DURACION</a:t>
-                      </a:r>
-                    </a:p>
-                  </a:txBody>
-                  <a:tcPr marL="6772" marR="6772" marT="6772" marB="0" anchor="ctr">
-                    <a:solidFill>
-                      <a:schemeClr val="accent5"/>
-                    </a:solidFill>
-                  </a:tcPr>
-                </a:tc>
-                <a:tc>
-                  <a:txBody>
-                    <a:bodyPr/>
-                    <a:lstStyle/>
-                    <a:p>
-                      <a:pPr algn="ctr" rtl="0" fontAlgn="ctr"/>
-                      <a:r>
                         <a:rPr lang="es-PE" sz="1200" b="1" u="none" strike="noStrike" dirty="0">
                           <a:effectLst/>
                         </a:rPr>
@@ -5519,90 +5454,8 @@
                     <a:p>
                       <a:pPr algn="ctr"/>
                       <a:r>
-                        <a:rPr lang="es-PE" sz="1000" dirty="0">
-                          <a:latin typeface="Arial Narrow" panose="020B0606020202030204" pitchFamily="34" charset="0"/>
-                        </a:rPr>
-                        <a:t>2469801</a:t>
-                      </a:r>
-                    </a:p>
-                  </a:txBody>
-                  <a:tcPr/>
-                </a:tc>
-                <a:tc>
-                  <a:txBody>
-                    <a:bodyPr/>
-                    <a:lstStyle/>
-                    <a:p>
-                      <a:pPr marL="0" marR="0" lvl="0" indent="0" algn="ctr" defTabSz="914400" rtl="0" eaLnBrk="1" fontAlgn="ctr" latinLnBrk="0" hangingPunct="1">
-                        <a:lnSpc>
-                          <a:spcPct val="100000"/>
-                        </a:lnSpc>
-                        <a:spcBef>
-                          <a:spcPts val="0"/>
-                        </a:spcBef>
-                        <a:spcAft>
-                          <a:spcPts val="0"/>
-                        </a:spcAft>
-                        <a:buClrTx/>
-                        <a:buSzTx/>
-                        <a:buFontTx/>
-                        <a:buNone/>
-                        <a:tabLst/>
-                        <a:defRPr/>
-                      </a:pPr>
-                      <a:r>
-                        <a:rPr lang="es-PE" sz="1000" b="0" i="0" u="none" strike="noStrike" dirty="0">
-                          <a:solidFill>
-                            <a:srgbClr val="000000"/>
-                          </a:solidFill>
-                          <a:effectLst/>
-                          <a:latin typeface="Arial Narrow" panose="020B0606020202030204" pitchFamily="34" charset="0"/>
-                        </a:rPr>
-                        <a:t>----</a:t>
-                      </a:r>
-                    </a:p>
-                    <a:p>
-                      <a:pPr algn="ctr" rtl="0" fontAlgn="ctr"/>
-                      <a:endParaRPr lang="es-PE" sz="1000" b="0" i="0" u="none" strike="noStrike" dirty="0">
-                        <a:solidFill>
-                          <a:srgbClr val="000000"/>
-                        </a:solidFill>
-                        <a:effectLst/>
-                        <a:latin typeface="Arial Narrow" panose="020B0606020202030204" pitchFamily="34" charset="0"/>
-                      </a:endParaRPr>
-                    </a:p>
-                  </a:txBody>
-                  <a:tcPr marL="6772" marR="6772" marT="6772" marB="0" anchor="ctr"/>
-                </a:tc>
-                <a:tc>
-                  <a:txBody>
-                    <a:bodyPr/>
-                    <a:lstStyle/>
-                    <a:p>
-                      <a:pPr marL="0" marR="0" lvl="0" indent="0" algn="l" defTabSz="914400" rtl="0" eaLnBrk="1" fontAlgn="auto" latinLnBrk="0" hangingPunct="1">
-                        <a:lnSpc>
-                          <a:spcPct val="100000"/>
-                        </a:lnSpc>
-                        <a:spcBef>
-                          <a:spcPts val="0"/>
-                        </a:spcBef>
-                        <a:spcAft>
-                          <a:spcPts val="0"/>
-                        </a:spcAft>
-                        <a:buClr>
-                          <a:srgbClr val="000000"/>
-                        </a:buClr>
-                        <a:buSzTx/>
-                        <a:buFont typeface="Arial"/>
-                        <a:buNone/>
-                        <a:tabLst/>
-                        <a:defRPr/>
-                      </a:pPr>
-                      <a:r>
-                        <a:rPr lang="es-PE" sz="1000" b="0" dirty="0">
-                          <a:latin typeface="Arial Narrow" panose="020B0606020202030204" pitchFamily="34" charset="0"/>
-                        </a:rPr>
-                        <a:t>MEJORAMIENTO DEL SERVICIO EDUCATIVO DEL NIVEL PRIMARIA DE LAS I.E. 55007, I.E. 54255 EN LAS LOCALIDADES DE ANTABAMBA Y CHUÑOHUACHO DEL DISTRITO DE ANTABAMBA - PROVINCIA DE ANTABAMBA - DEPARTAMENTO DE APURIMAC</a:t>
+                        <a:rPr lang="es-PE" sz="800" dirty="0"/>
+                        <a:t>2415944</a:t>
                       </a:r>
                     </a:p>
                   </a:txBody>
@@ -5633,13 +5486,44 @@
                         <a:defRPr/>
                       </a:pPr>
                       <a:r>
-                        <a:rPr lang="es-PE" sz="1000" b="0" dirty="0">
+                        <a:rPr lang="es-PE" sz="800" b="0" dirty="0"/>
+                        <a:t>CREACION DE UN CENTRO DE ACOGIDA RESIDENCIAL PARA NIÑO,NIÑAS Y ADOLESCENTES CON DISCAPACIDAD EN EL CENTRO POBLADO DE LAMBRAMA DEL DISTRITO DE LAMBRAMA - PROVINCIA DE ABANCAY - DEPARTAMENTO DE APURIMAC</a:t>
+                      </a:r>
+                    </a:p>
+                  </a:txBody>
+                  <a:tcPr/>
+                </a:tc>
+                <a:tc>
+                  <a:txBody>
+                    <a:bodyPr/>
+                    <a:lstStyle/>
+                    <a:p>
+                      <a:pPr marL="0" marR="0" lvl="0" indent="0" algn="l" defTabSz="914400" rtl="0" eaLnBrk="1" fontAlgn="auto" latinLnBrk="0" hangingPunct="1">
+                        <a:lnSpc>
+                          <a:spcPct val="100000"/>
+                        </a:lnSpc>
+                        <a:spcBef>
+                          <a:spcPts val="0"/>
+                        </a:spcBef>
+                        <a:spcAft>
+                          <a:spcPts val="0"/>
+                        </a:spcAft>
+                        <a:buClr>
+                          <a:srgbClr val="000000"/>
+                        </a:buClr>
+                        <a:buSzTx/>
+                        <a:buFont typeface="Arial"/>
+                        <a:buNone/>
+                        <a:tabLst/>
+                        <a:defRPr/>
+                      </a:pPr>
+                      <a:r>
+                        <a:rPr lang="es-PE" sz="800" b="0" dirty="0">
                           <a:solidFill>
                             <a:schemeClr val="tx1"/>
                           </a:solidFill>
-                          <a:latin typeface="Arial Narrow" panose="020B0606020202030204" pitchFamily="34" charset="0"/>
                         </a:rPr>
-                        <a:t>12,850,304.96</a:t>
+                        <a:t>19,032,429.23</a:t>
                       </a:r>
                     </a:p>
                   </a:txBody>
@@ -5670,34 +5554,16 @@
                         <a:defRPr/>
                       </a:pPr>
                       <a:r>
-                        <a:rPr lang="es-PE" sz="1000" b="0" dirty="0">
+                        <a:rPr lang="es-PE" sz="800" b="0" dirty="0">
                           <a:solidFill>
                             <a:schemeClr val="tx1"/>
                           </a:solidFill>
-                          <a:latin typeface="Arial Narrow" panose="020B0606020202030204" pitchFamily="34" charset="0"/>
                         </a:rPr>
                         <a:t>Viable</a:t>
                       </a:r>
                     </a:p>
                   </a:txBody>
                   <a:tcPr/>
-                </a:tc>
-                <a:tc>
-                  <a:txBody>
-                    <a:bodyPr/>
-                    <a:lstStyle/>
-                    <a:p>
-                      <a:pPr algn="ctr" rtl="0" fontAlgn="ctr"/>
-                      <a:endParaRPr lang="es-PE" sz="1000" b="0" i="0" u="none" strike="noStrike" dirty="0">
-                        <a:solidFill>
-                          <a:srgbClr val="000000"/>
-                        </a:solidFill>
-                        <a:effectLst/>
-                        <a:latin typeface="Arial Narrow" panose="020B0606020202030204" pitchFamily="34" charset="0"/>
-                      </a:endParaRPr>
-                    </a:p>
-                  </a:txBody>
-                  <a:tcPr marL="6772" marR="6772" marT="6772" marB="0" anchor="ctr"/>
                 </a:tc>
                 <a:tc>
                   <a:txBody>
@@ -5724,50 +5590,38 @@
                         <a:defRPr/>
                       </a:pPr>
                       <a:r>
-                        <a:rPr lang="es-PE" sz="1000" b="0" i="0" u="none" strike="noStrike" cap="none" dirty="0">
+                        <a:rPr lang="es-PE" sz="800" b="0" i="0" u="none" strike="noStrike" cap="none" dirty="0">
                           <a:solidFill>
                             <a:schemeClr val="tx1"/>
                           </a:solidFill>
-                          <a:latin typeface="Arial Narrow" panose="020B0606020202030204" pitchFamily="34" charset="0"/>
+                          <a:latin typeface="+mn-lt"/>
                           <a:ea typeface="+mn-ea"/>
                           <a:cs typeface="+mn-cs"/>
                           <a:sym typeface="Arial"/>
                         </a:rPr>
-                        <a:t>02 IEI </a:t>
+                        <a:t>60 NNA con </a:t>
                       </a:r>
-                    </a:p>
-                    <a:p>
-                      <a:pPr marL="171450" marR="0" lvl="0" indent="-171450" algn="l" defTabSz="914400" rtl="0" eaLnBrk="1" fontAlgn="auto" latinLnBrk="0" hangingPunct="1">
-                        <a:lnSpc>
-                          <a:spcPct val="100000"/>
-                        </a:lnSpc>
-                        <a:spcBef>
-                          <a:spcPts val="0"/>
-                        </a:spcBef>
-                        <a:spcAft>
-                          <a:spcPts val="0"/>
-                        </a:spcAft>
-                        <a:buClr>
-                          <a:srgbClr val="000000"/>
-                        </a:buClr>
-                        <a:buSzTx/>
-                        <a:buFont typeface="Arial" panose="020B0604020202020204" pitchFamily="34" charset="0"/>
-                        <a:buChar char="•"/>
-                        <a:tabLst/>
-                        <a:defRPr/>
-                      </a:pPr>
                       <a:r>
-                        <a:rPr lang="es-PE" sz="1000" b="0" i="0" u="none" strike="noStrike" cap="none" dirty="0">
+                        <a:rPr lang="es-PE" sz="800" b="0" i="0" u="none" strike="noStrike" cap="none" dirty="0" err="1">
                           <a:solidFill>
                             <a:schemeClr val="tx1"/>
                           </a:solidFill>
-                          <a:latin typeface="Arial Narrow" panose="020B0606020202030204" pitchFamily="34" charset="0"/>
+                          <a:latin typeface="+mn-lt"/>
                           <a:ea typeface="+mn-ea"/>
                           <a:cs typeface="+mn-cs"/>
                           <a:sym typeface="Arial"/>
                         </a:rPr>
-                        <a:t>209 alumnos</a:t>
+                        <a:t>discapacida</a:t>
                       </a:r>
+                      <a:endParaRPr lang="es-PE" sz="800" b="0" i="0" u="none" strike="noStrike" cap="none" dirty="0">
+                        <a:solidFill>
+                          <a:schemeClr val="tx1"/>
+                        </a:solidFill>
+                        <a:latin typeface="+mn-lt"/>
+                        <a:ea typeface="+mn-ea"/>
+                        <a:cs typeface="+mn-cs"/>
+                        <a:sym typeface="Arial"/>
+                      </a:endParaRPr>
                     </a:p>
                   </a:txBody>
                   <a:tcPr/>
@@ -5778,6 +5632,26 @@
                     <a:lstStyle/>
                     <a:p>
                       <a:pPr algn="l" fontAlgn="ctr"/>
+                      <a:r>
+                        <a:rPr lang="es-PE" sz="1000" b="0" i="0" u="none" strike="noStrike" dirty="0">
+                          <a:solidFill>
+                            <a:srgbClr val="000000"/>
+                          </a:solidFill>
+                          <a:effectLst/>
+                          <a:latin typeface="Arial Narrow" panose="020B0606020202030204" pitchFamily="34" charset="0"/>
+                        </a:rPr>
+                        <a:t>En </a:t>
+                      </a:r>
+                      <a:r>
+                        <a:rPr lang="es-PE" sz="1000" b="0" i="0" u="none" strike="noStrike" dirty="0" err="1">
+                          <a:solidFill>
+                            <a:srgbClr val="000000"/>
+                          </a:solidFill>
+                          <a:effectLst/>
+                          <a:latin typeface="Arial Narrow" panose="020B0606020202030204" pitchFamily="34" charset="0"/>
+                        </a:rPr>
+                        <a:t>conve</a:t>
+                      </a:r>
                       <a:endParaRPr lang="es-PE" sz="1000" b="0" i="0" u="none" strike="noStrike" dirty="0">
                         <a:solidFill>
                           <a:srgbClr val="000000"/>
@@ -5795,7 +5669,7 @@
                   </a:ext>
                 </a:extLst>
               </a:tr>
-              <a:tr h="173080">
+              <a:tr h="436910">
                 <a:tc>
                   <a:txBody>
                     <a:bodyPr/>
@@ -5837,101 +5711,24 @@
                         <a:buFont typeface="Arial"/>
                       </a:pPr>
                       <a:r>
-                        <a:rPr lang="es-PE" sz="1000" b="0" i="0" u="none" strike="noStrike" cap="none" dirty="0">
+                        <a:rPr lang="es-PE" sz="800" b="0" i="0" u="none" strike="noStrike" cap="none" dirty="0">
                           <a:solidFill>
                             <a:srgbClr val="000000"/>
                           </a:solidFill>
-                          <a:latin typeface="Arial Narrow" panose="020B0606020202030204" pitchFamily="34" charset="0"/>
+                          <a:latin typeface="+mn-lt"/>
                           <a:cs typeface="Arial"/>
                           <a:sym typeface="Arial"/>
                         </a:rPr>
-                        <a:t>2462393</a:t>
+                        <a:t>2446533</a:t>
                       </a:r>
-                    </a:p>
-                  </a:txBody>
-                  <a:tcPr/>
-                </a:tc>
-                <a:tc>
-                  <a:txBody>
-                    <a:bodyPr/>
-                    <a:lstStyle/>
-                    <a:p>
-                      <a:pPr marL="0" marR="0" lvl="0" indent="0" algn="ctr" defTabSz="914400" rtl="0" eaLnBrk="1" fontAlgn="ctr" latinLnBrk="0" hangingPunct="1">
-                        <a:lnSpc>
-                          <a:spcPct val="100000"/>
-                        </a:lnSpc>
-                        <a:spcBef>
-                          <a:spcPts val="0"/>
-                        </a:spcBef>
-                        <a:spcAft>
-                          <a:spcPts val="0"/>
-                        </a:spcAft>
-                        <a:buClrTx/>
-                        <a:buSzTx/>
-                        <a:buFontTx/>
-                        <a:buNone/>
-                        <a:tabLst/>
-                        <a:defRPr/>
-                      </a:pPr>
-                      <a:r>
-                        <a:rPr lang="es-PE" sz="1000" b="0" i="0" u="none" strike="noStrike" dirty="0">
-                          <a:solidFill>
-                            <a:srgbClr val="000000"/>
-                          </a:solidFill>
-                          <a:effectLst/>
-                          <a:latin typeface="Arial Narrow" panose="020B0606020202030204" pitchFamily="34" charset="0"/>
-                        </a:rPr>
-                        <a:t>----</a:t>
-                      </a:r>
-                    </a:p>
-                    <a:p>
-                      <a:pPr algn="ctr" rtl="0" fontAlgn="ctr"/>
-                      <a:endParaRPr lang="es-PE" sz="1000" b="0" i="0" u="none" strike="noStrike" dirty="0">
+                      <a:endParaRPr lang="es-PE" sz="800" b="0" i="0" u="none" strike="noStrike" cap="none" dirty="0">
                         <a:solidFill>
                           <a:srgbClr val="000000"/>
                         </a:solidFill>
-                        <a:effectLst/>
-                        <a:latin typeface="Arial Narrow" panose="020B0606020202030204" pitchFamily="34" charset="0"/>
+                        <a:latin typeface="Arial"/>
+                        <a:cs typeface="Arial"/>
+                        <a:sym typeface="Arial"/>
                       </a:endParaRPr>
-                    </a:p>
-                  </a:txBody>
-                  <a:tcPr marL="6772" marR="6772" marT="6772" marB="0" anchor="ctr"/>
-                </a:tc>
-                <a:tc>
-                  <a:txBody>
-                    <a:bodyPr/>
-                    <a:lstStyle/>
-                    <a:p>
-                      <a:pPr marL="0" marR="0" lvl="0" indent="0" algn="l" defTabSz="914400" rtl="0" eaLnBrk="1" fontAlgn="auto" latinLnBrk="0" hangingPunct="1">
-                        <a:lnSpc>
-                          <a:spcPct val="100000"/>
-                        </a:lnSpc>
-                        <a:spcBef>
-                          <a:spcPts val="0"/>
-                        </a:spcBef>
-                        <a:spcAft>
-                          <a:spcPts val="0"/>
-                        </a:spcAft>
-                        <a:buClr>
-                          <a:srgbClr val="000000"/>
-                        </a:buClr>
-                        <a:buSzTx/>
-                        <a:buFont typeface="Arial"/>
-                        <a:buNone/>
-                        <a:tabLst/>
-                        <a:defRPr/>
-                      </a:pPr>
-                      <a:r>
-                        <a:rPr lang="es-PE" sz="1000" b="0" i="0" u="none" strike="noStrike" cap="none" dirty="0">
-                          <a:solidFill>
-                            <a:srgbClr val="000000"/>
-                          </a:solidFill>
-                          <a:latin typeface="Arial Narrow" panose="020B0606020202030204" pitchFamily="34" charset="0"/>
-                          <a:cs typeface="Arial"/>
-                          <a:sym typeface="Arial"/>
-                        </a:rPr>
-                        <a:t>MEJORAMIENTO DEL SERVICIO EDUCATIVO DEL NIVEL INICIAL CUNA - N°01 Y 02 ANGELITOS DE JESÚS DISTRITO DE ABANCAY - PROVINCIA DE ABANCAY - DEPARTAMENTO DE APURIMAC</a:t>
-                      </a:r>
                     </a:p>
                   </a:txBody>
                   <a:tcPr/>
@@ -5961,16 +5758,71 @@
                         <a:defRPr/>
                       </a:pPr>
                       <a:r>
-                        <a:rPr lang="es-PE" sz="1000" b="0" i="0" u="none" strike="noStrike" cap="none" dirty="0">
+                        <a:rPr lang="es-PE" sz="800" b="0" i="0" u="none" strike="noStrike" cap="none" dirty="0">
                           <a:solidFill>
                             <a:srgbClr val="000000"/>
                           </a:solidFill>
-                          <a:latin typeface="Arial Narrow" panose="020B0606020202030204" pitchFamily="34" charset="0"/>
+                          <a:latin typeface="+mn-lt"/>
                           <a:cs typeface="Arial"/>
                           <a:sym typeface="Arial"/>
                         </a:rPr>
-                        <a:t>11,115,996.34</a:t>
+                        <a:t>CREACION DEL COLISEO MULTIUSO MUNICIPAL CHUQUIBAMBILLA DEL DISTRITO DE CHUQUIBAMBILLA - PROVINCIA DE GRAU - DEPARTAMENTO DE APURIMAC</a:t>
                       </a:r>
+                      <a:endParaRPr lang="es-PE" sz="800" b="0" i="0" u="none" strike="noStrike" cap="none" dirty="0">
+                        <a:solidFill>
+                          <a:srgbClr val="000000"/>
+                        </a:solidFill>
+                        <a:latin typeface="Arial"/>
+                        <a:cs typeface="Arial"/>
+                        <a:sym typeface="Arial"/>
+                      </a:endParaRPr>
+                    </a:p>
+                  </a:txBody>
+                  <a:tcPr/>
+                </a:tc>
+                <a:tc>
+                  <a:txBody>
+                    <a:bodyPr/>
+                    <a:lstStyle/>
+                    <a:p>
+                      <a:pPr marL="0" marR="0" lvl="0" indent="0" algn="l" defTabSz="914400" rtl="0" eaLnBrk="1" fontAlgn="auto" latinLnBrk="0" hangingPunct="1">
+                        <a:lnSpc>
+                          <a:spcPct val="100000"/>
+                        </a:lnSpc>
+                        <a:spcBef>
+                          <a:spcPts val="0"/>
+                        </a:spcBef>
+                        <a:spcAft>
+                          <a:spcPts val="0"/>
+                        </a:spcAft>
+                        <a:buClr>
+                          <a:srgbClr val="000000"/>
+                        </a:buClr>
+                        <a:buSzTx/>
+                        <a:buFont typeface="Arial"/>
+                        <a:buNone/>
+                        <a:tabLst/>
+                        <a:defRPr/>
+                      </a:pPr>
+                      <a:r>
+                        <a:rPr lang="es-PE" sz="800" b="0" i="0" u="none" strike="noStrike" cap="none" dirty="0">
+                          <a:solidFill>
+                            <a:srgbClr val="000000"/>
+                          </a:solidFill>
+                          <a:latin typeface="+mn-lt"/>
+                          <a:cs typeface="Arial"/>
+                          <a:sym typeface="Arial"/>
+                        </a:rPr>
+                        <a:t>9,276,356.76</a:t>
+                      </a:r>
+                      <a:endParaRPr lang="es-PE" sz="800" b="0" i="0" u="none" strike="noStrike" cap="none" dirty="0">
+                        <a:solidFill>
+                          <a:srgbClr val="000000"/>
+                        </a:solidFill>
+                        <a:latin typeface="Arial"/>
+                        <a:cs typeface="Arial"/>
+                        <a:sym typeface="Arial"/>
+                      </a:endParaRPr>
                     </a:p>
                   </a:txBody>
                   <a:tcPr/>
@@ -6000,34 +5852,16 @@
                         <a:defRPr/>
                       </a:pPr>
                       <a:r>
-                        <a:rPr lang="es-PE" sz="1000" b="0" dirty="0">
+                        <a:rPr lang="es-PE" sz="800" b="0" dirty="0">
                           <a:solidFill>
                             <a:schemeClr val="tx1"/>
                           </a:solidFill>
-                          <a:latin typeface="Arial Narrow" panose="020B0606020202030204" pitchFamily="34" charset="0"/>
                         </a:rPr>
                         <a:t>Viable</a:t>
                       </a:r>
                     </a:p>
                   </a:txBody>
                   <a:tcPr/>
-                </a:tc>
-                <a:tc>
-                  <a:txBody>
-                    <a:bodyPr/>
-                    <a:lstStyle/>
-                    <a:p>
-                      <a:pPr algn="ctr" rtl="0" fontAlgn="ctr"/>
-                      <a:endParaRPr lang="es-PE" sz="1000" b="0" i="0" u="none" strike="noStrike" dirty="0">
-                        <a:solidFill>
-                          <a:srgbClr val="000000"/>
-                        </a:solidFill>
-                        <a:effectLst/>
-                        <a:latin typeface="Arial Narrow" panose="020B0606020202030204" pitchFamily="34" charset="0"/>
-                      </a:endParaRPr>
-                    </a:p>
-                  </a:txBody>
-                  <a:tcPr marL="6772" marR="6772" marT="6772" marB="0" anchor="ctr"/>
                 </a:tc>
                 <a:tc>
                   <a:txBody>
@@ -6054,48 +5888,24 @@
                         <a:defRPr/>
                       </a:pPr>
                       <a:r>
-                        <a:rPr lang="es-PE" sz="1000" b="0" i="0" u="none" strike="noStrike" cap="none" dirty="0">
+                        <a:rPr lang="es-PE" sz="800" b="0" i="0" u="none" strike="noStrike" cap="none" dirty="0">
                           <a:solidFill>
                             <a:srgbClr val="000000"/>
                           </a:solidFill>
-                          <a:latin typeface="Arial Narrow" panose="020B0606020202030204" pitchFamily="34" charset="0"/>
+                          <a:latin typeface="+mn-lt"/>
                           <a:cs typeface="Arial"/>
                           <a:sym typeface="Arial"/>
                         </a:rPr>
-                        <a:t>02 IEI </a:t>
+                        <a:t>3692 beneficiarios directos</a:t>
                       </a:r>
-                    </a:p>
-                    <a:p>
-                      <a:pPr marL="171450" marR="0" lvl="0" indent="-171450" algn="l" defTabSz="914400" rtl="0" eaLnBrk="1" fontAlgn="auto" latinLnBrk="0" hangingPunct="1">
-                        <a:lnSpc>
-                          <a:spcPct val="100000"/>
-                        </a:lnSpc>
-                        <a:spcBef>
-                          <a:spcPts val="0"/>
-                        </a:spcBef>
-                        <a:spcAft>
-                          <a:spcPts val="0"/>
-                        </a:spcAft>
-                        <a:buClr>
+                      <a:endParaRPr lang="es-PE" sz="800" b="0" i="0" u="none" strike="noStrike" cap="none" dirty="0">
+                        <a:solidFill>
                           <a:srgbClr val="000000"/>
-                        </a:buClr>
-                        <a:buSzTx/>
-                        <a:buFont typeface="Arial" panose="020B0604020202020204" pitchFamily="34" charset="0"/>
-                        <a:buChar char="•"/>
-                        <a:tabLst/>
-                        <a:defRPr/>
-                      </a:pPr>
-                      <a:r>
-                        <a:rPr lang="es-PE" sz="1000" b="0" i="0" u="none" strike="noStrike" cap="none" dirty="0">
-                          <a:solidFill>
-                            <a:srgbClr val="000000"/>
-                          </a:solidFill>
-                          <a:latin typeface="Arial Narrow" panose="020B0606020202030204" pitchFamily="34" charset="0"/>
-                          <a:cs typeface="Arial"/>
-                          <a:sym typeface="Arial"/>
-                        </a:rPr>
-                        <a:t>109 alumnos</a:t>
-                      </a:r>
+                        </a:solidFill>
+                        <a:latin typeface="Arial"/>
+                        <a:cs typeface="Arial"/>
+                        <a:sym typeface="Arial"/>
+                      </a:endParaRPr>
                     </a:p>
                   </a:txBody>
                   <a:tcPr/>
@@ -6123,1092 +5933,6 @@
                   </a:ext>
                 </a:extLst>
               </a:tr>
-              <a:tr h="129239">
-                <a:tc>
-                  <a:txBody>
-                    <a:bodyPr/>
-                    <a:lstStyle/>
-                    <a:p>
-                      <a:pPr algn="ctr" fontAlgn="ctr"/>
-                      <a:r>
-                        <a:rPr lang="es-PE" sz="1000" b="0" i="0" u="none" strike="noStrike" dirty="0">
-                          <a:solidFill>
-                            <a:srgbClr val="000000"/>
-                          </a:solidFill>
-                          <a:effectLst/>
-                          <a:latin typeface="Arial Narrow" panose="020B0606020202030204" pitchFamily="34" charset="0"/>
-                        </a:rPr>
-                        <a:t>3</a:t>
-                      </a:r>
-                    </a:p>
-                  </a:txBody>
-                  <a:tcPr marL="6772" marR="6772" marT="6772" marB="0" anchor="ctr"/>
-                </a:tc>
-                <a:tc>
-                  <a:txBody>
-                    <a:bodyPr/>
-                    <a:lstStyle/>
-                    <a:p>
-                      <a:pPr marR="0" algn="ctr" rtl="0">
-                        <a:lnSpc>
-                          <a:spcPct val="100000"/>
-                        </a:lnSpc>
-                        <a:spcBef>
-                          <a:spcPts val="0"/>
-                        </a:spcBef>
-                        <a:spcAft>
-                          <a:spcPts val="0"/>
-                        </a:spcAft>
-                        <a:buClr>
-                          <a:srgbClr val="000000"/>
-                        </a:buClr>
-                        <a:buFont typeface="Arial"/>
-                      </a:pPr>
-                      <a:r>
-                        <a:rPr lang="es-PE" sz="1000" b="0" i="0" u="none" strike="noStrike" cap="none" dirty="0">
-                          <a:solidFill>
-                            <a:srgbClr val="000000"/>
-                          </a:solidFill>
-                          <a:latin typeface="Arial Narrow" panose="020B0606020202030204" pitchFamily="34" charset="0"/>
-                          <a:cs typeface="Arial"/>
-                          <a:sym typeface="Arial"/>
-                        </a:rPr>
-                        <a:t>2469625</a:t>
-                      </a:r>
-                    </a:p>
-                  </a:txBody>
-                  <a:tcPr/>
-                </a:tc>
-                <a:tc>
-                  <a:txBody>
-                    <a:bodyPr/>
-                    <a:lstStyle/>
-                    <a:p>
-                      <a:pPr marL="0" marR="0" lvl="0" indent="0" algn="ctr" defTabSz="914400" rtl="0" eaLnBrk="1" fontAlgn="ctr" latinLnBrk="0" hangingPunct="1">
-                        <a:lnSpc>
-                          <a:spcPct val="100000"/>
-                        </a:lnSpc>
-                        <a:spcBef>
-                          <a:spcPts val="0"/>
-                        </a:spcBef>
-                        <a:spcAft>
-                          <a:spcPts val="0"/>
-                        </a:spcAft>
-                        <a:buClrTx/>
-                        <a:buSzTx/>
-                        <a:buFontTx/>
-                        <a:buNone/>
-                        <a:tabLst/>
-                        <a:defRPr/>
-                      </a:pPr>
-                      <a:r>
-                        <a:rPr lang="es-PE" sz="1000" b="0" i="0" u="none" strike="noStrike" dirty="0">
-                          <a:solidFill>
-                            <a:srgbClr val="000000"/>
-                          </a:solidFill>
-                          <a:effectLst/>
-                          <a:latin typeface="Arial Narrow" panose="020B0606020202030204" pitchFamily="34" charset="0"/>
-                        </a:rPr>
-                        <a:t>----</a:t>
-                      </a:r>
-                    </a:p>
-                    <a:p>
-                      <a:pPr algn="ctr" rtl="0" fontAlgn="ctr"/>
-                      <a:endParaRPr lang="es-PE" sz="1000" b="0" i="0" u="none" strike="noStrike" dirty="0">
-                        <a:solidFill>
-                          <a:srgbClr val="000000"/>
-                        </a:solidFill>
-                        <a:effectLst/>
-                        <a:latin typeface="Arial Narrow" panose="020B0606020202030204" pitchFamily="34" charset="0"/>
-                      </a:endParaRPr>
-                    </a:p>
-                  </a:txBody>
-                  <a:tcPr marL="6772" marR="6772" marT="6772" marB="0" anchor="ctr"/>
-                </a:tc>
-                <a:tc>
-                  <a:txBody>
-                    <a:bodyPr/>
-                    <a:lstStyle/>
-                    <a:p>
-                      <a:r>
-                        <a:rPr lang="es-PE" sz="1000" b="0" i="0" u="none" strike="noStrike" cap="none" dirty="0">
-                          <a:solidFill>
-                            <a:srgbClr val="000000"/>
-                          </a:solidFill>
-                          <a:latin typeface="Arial Narrow" panose="020B0606020202030204" pitchFamily="34" charset="0"/>
-                          <a:cs typeface="Arial"/>
-                          <a:sym typeface="Arial"/>
-                        </a:rPr>
-                        <a:t>MEJORAMIENTO DEL SERVICIO EDUCATIVO DE LA EDUCACIÓN BÁSICA ALTERNATIVA EN LAS 7 PROVINCIAS DEL DEPARTAMENTO DE APURIMAC</a:t>
-                      </a:r>
-                    </a:p>
-                  </a:txBody>
-                  <a:tcPr/>
-                </a:tc>
-                <a:tc>
-                  <a:txBody>
-                    <a:bodyPr/>
-                    <a:lstStyle/>
-                    <a:p>
-                      <a:r>
-                        <a:rPr lang="es-PE" sz="1000" b="0" i="0" u="none" strike="noStrike" cap="none" dirty="0">
-                          <a:solidFill>
-                            <a:srgbClr val="000000"/>
-                          </a:solidFill>
-                          <a:latin typeface="Arial Narrow" panose="020B0606020202030204" pitchFamily="34" charset="0"/>
-                          <a:cs typeface="Arial"/>
-                          <a:sym typeface="Arial"/>
-                        </a:rPr>
-                        <a:t>28,336,298.32</a:t>
-                      </a:r>
-                    </a:p>
-                  </a:txBody>
-                  <a:tcPr/>
-                </a:tc>
-                <a:tc>
-                  <a:txBody>
-                    <a:bodyPr/>
-                    <a:lstStyle/>
-                    <a:p>
-                      <a:pPr marL="0" marR="0" lvl="0" indent="0" algn="ctr" defTabSz="914400" rtl="0" eaLnBrk="1" fontAlgn="auto" latinLnBrk="0" hangingPunct="1">
-                        <a:lnSpc>
-                          <a:spcPct val="100000"/>
-                        </a:lnSpc>
-                        <a:spcBef>
-                          <a:spcPts val="0"/>
-                        </a:spcBef>
-                        <a:spcAft>
-                          <a:spcPts val="0"/>
-                        </a:spcAft>
-                        <a:buClr>
-                          <a:srgbClr val="000000"/>
-                        </a:buClr>
-                        <a:buSzTx/>
-                        <a:buFont typeface="Arial"/>
-                        <a:buNone/>
-                        <a:tabLst/>
-                        <a:defRPr/>
-                      </a:pPr>
-                      <a:r>
-                        <a:rPr lang="es-PE" sz="1000" b="0" dirty="0">
-                          <a:solidFill>
-                            <a:schemeClr val="tx1"/>
-                          </a:solidFill>
-                          <a:latin typeface="Arial Narrow" panose="020B0606020202030204" pitchFamily="34" charset="0"/>
-                        </a:rPr>
-                        <a:t>Viable</a:t>
-                      </a:r>
-                    </a:p>
-                  </a:txBody>
-                  <a:tcPr/>
-                </a:tc>
-                <a:tc>
-                  <a:txBody>
-                    <a:bodyPr/>
-                    <a:lstStyle/>
-                    <a:p>
-                      <a:pPr algn="ctr" rtl="0" fontAlgn="ctr"/>
-                      <a:endParaRPr lang="es-PE" sz="1000" b="0" i="0" u="none" strike="noStrike" dirty="0">
-                        <a:solidFill>
-                          <a:srgbClr val="000000"/>
-                        </a:solidFill>
-                        <a:effectLst/>
-                        <a:latin typeface="Arial Narrow" panose="020B0606020202030204" pitchFamily="34" charset="0"/>
-                      </a:endParaRPr>
-                    </a:p>
-                  </a:txBody>
-                  <a:tcPr marL="6772" marR="6772" marT="6772" marB="0" anchor="ctr"/>
-                </a:tc>
-                <a:tc>
-                  <a:txBody>
-                    <a:bodyPr/>
-                    <a:lstStyle/>
-                    <a:p>
-                      <a:pPr marL="171450" indent="-171450">
-                        <a:buFont typeface="Arial" panose="020B0604020202020204" pitchFamily="34" charset="0"/>
-                        <a:buChar char="•"/>
-                      </a:pPr>
-                      <a:r>
-                        <a:rPr lang="es-PE" sz="1000" b="0" i="0" u="none" strike="noStrike" cap="none" dirty="0">
-                          <a:solidFill>
-                            <a:srgbClr val="000000"/>
-                          </a:solidFill>
-                          <a:latin typeface="Arial Narrow" panose="020B0606020202030204" pitchFamily="34" charset="0"/>
-                          <a:cs typeface="Arial"/>
-                          <a:sym typeface="Arial"/>
-                        </a:rPr>
-                        <a:t>23 CEBA</a:t>
-                      </a:r>
-                    </a:p>
-                    <a:p>
-                      <a:pPr marL="171450" indent="-171450">
-                        <a:buFont typeface="Arial" panose="020B0604020202020204" pitchFamily="34" charset="0"/>
-                        <a:buChar char="•"/>
-                      </a:pPr>
-                      <a:r>
-                        <a:rPr lang="es-PE" sz="1000" b="0" i="0" u="none" strike="noStrike" cap="none" dirty="0">
-                          <a:solidFill>
-                            <a:srgbClr val="000000"/>
-                          </a:solidFill>
-                          <a:latin typeface="Arial Narrow" panose="020B0606020202030204" pitchFamily="34" charset="0"/>
-                          <a:cs typeface="Arial"/>
-                          <a:sym typeface="Arial"/>
-                        </a:rPr>
-                        <a:t>1272 alumnos</a:t>
-                      </a:r>
-                    </a:p>
-                  </a:txBody>
-                  <a:tcPr/>
-                </a:tc>
-                <a:tc>
-                  <a:txBody>
-                    <a:bodyPr/>
-                    <a:lstStyle/>
-                    <a:p>
-                      <a:pPr algn="l" fontAlgn="ctr"/>
-                      <a:endParaRPr lang="es-PE" sz="1000" b="0" i="0" u="none" strike="noStrike" dirty="0">
-                        <a:solidFill>
-                          <a:srgbClr val="000000"/>
-                        </a:solidFill>
-                        <a:effectLst/>
-                        <a:latin typeface="Arial Narrow" panose="020B0606020202030204" pitchFamily="34" charset="0"/>
-                      </a:endParaRPr>
-                    </a:p>
-                  </a:txBody>
-                  <a:tcPr marL="6772" marR="6772" marT="6772" marB="0" anchor="ctr"/>
-                </a:tc>
-                <a:extLst>
-                  <a:ext uri="{0D108BD9-81ED-4DB2-BD59-A6C34878D82A}">
-                    <a16:rowId xmlns:a16="http://schemas.microsoft.com/office/drawing/2014/main" val="1462049621"/>
-                  </a:ext>
-                </a:extLst>
-              </a:tr>
-              <a:tr h="163894">
-                <a:tc>
-                  <a:txBody>
-                    <a:bodyPr/>
-                    <a:lstStyle/>
-                    <a:p>
-                      <a:pPr algn="ctr" fontAlgn="ctr"/>
-                      <a:r>
-                        <a:rPr lang="es-PE" sz="1000" b="0" i="0" u="none" strike="noStrike" dirty="0">
-                          <a:solidFill>
-                            <a:srgbClr val="000000"/>
-                          </a:solidFill>
-                          <a:effectLst/>
-                          <a:latin typeface="Arial Narrow" panose="020B0606020202030204" pitchFamily="34" charset="0"/>
-                        </a:rPr>
-                        <a:t>4</a:t>
-                      </a:r>
-                    </a:p>
-                  </a:txBody>
-                  <a:tcPr marL="6772" marR="6772" marT="6772" marB="0" anchor="ctr"/>
-                </a:tc>
-                <a:tc>
-                  <a:txBody>
-                    <a:bodyPr/>
-                    <a:lstStyle/>
-                    <a:p>
-                      <a:pPr marR="0" algn="ctr" rtl="0">
-                        <a:lnSpc>
-                          <a:spcPct val="100000"/>
-                        </a:lnSpc>
-                        <a:spcBef>
-                          <a:spcPts val="0"/>
-                        </a:spcBef>
-                        <a:spcAft>
-                          <a:spcPts val="0"/>
-                        </a:spcAft>
-                        <a:buClr>
-                          <a:srgbClr val="000000"/>
-                        </a:buClr>
-                        <a:buFont typeface="Arial"/>
-                      </a:pPr>
-                      <a:r>
-                        <a:rPr lang="es-PE" sz="1000" b="0" i="0" u="none" strike="noStrike" cap="none" dirty="0">
-                          <a:solidFill>
-                            <a:srgbClr val="000000"/>
-                          </a:solidFill>
-                          <a:latin typeface="Arial Narrow" panose="020B0606020202030204" pitchFamily="34" charset="0"/>
-                          <a:cs typeface="Arial"/>
-                          <a:sym typeface="Arial"/>
-                        </a:rPr>
-                        <a:t>2462394</a:t>
-                      </a:r>
-                    </a:p>
-                  </a:txBody>
-                  <a:tcPr/>
-                </a:tc>
-                <a:tc>
-                  <a:txBody>
-                    <a:bodyPr/>
-                    <a:lstStyle/>
-                    <a:p>
-                      <a:pPr marL="0" marR="0" lvl="0" indent="0" algn="ctr" defTabSz="914400" rtl="0" eaLnBrk="1" fontAlgn="ctr" latinLnBrk="0" hangingPunct="1">
-                        <a:lnSpc>
-                          <a:spcPct val="100000"/>
-                        </a:lnSpc>
-                        <a:spcBef>
-                          <a:spcPts val="0"/>
-                        </a:spcBef>
-                        <a:spcAft>
-                          <a:spcPts val="0"/>
-                        </a:spcAft>
-                        <a:buClrTx/>
-                        <a:buSzTx/>
-                        <a:buFontTx/>
-                        <a:buNone/>
-                        <a:tabLst/>
-                        <a:defRPr/>
-                      </a:pPr>
-                      <a:r>
-                        <a:rPr lang="es-PE" sz="1000" b="0" i="0" u="none" strike="noStrike" dirty="0">
-                          <a:solidFill>
-                            <a:srgbClr val="000000"/>
-                          </a:solidFill>
-                          <a:effectLst/>
-                          <a:latin typeface="Arial Narrow" panose="020B0606020202030204" pitchFamily="34" charset="0"/>
-                        </a:rPr>
-                        <a:t>----</a:t>
-                      </a:r>
-                    </a:p>
-                    <a:p>
-                      <a:pPr algn="ctr" rtl="0" fontAlgn="ctr"/>
-                      <a:endParaRPr lang="es-PE" sz="1000" b="0" i="0" u="none" strike="noStrike" dirty="0">
-                        <a:solidFill>
-                          <a:srgbClr val="000000"/>
-                        </a:solidFill>
-                        <a:effectLst/>
-                        <a:latin typeface="Arial Narrow" panose="020B0606020202030204" pitchFamily="34" charset="0"/>
-                      </a:endParaRPr>
-                    </a:p>
-                  </a:txBody>
-                  <a:tcPr marL="6772" marR="6772" marT="6772" marB="0" anchor="ctr"/>
-                </a:tc>
-                <a:tc>
-                  <a:txBody>
-                    <a:bodyPr/>
-                    <a:lstStyle/>
-                    <a:p>
-                      <a:r>
-                        <a:rPr lang="es-PE" sz="1000" b="0" i="0" u="none" strike="noStrike" cap="none" dirty="0">
-                          <a:solidFill>
-                            <a:srgbClr val="000000"/>
-                          </a:solidFill>
-                          <a:latin typeface="Arial Narrow" panose="020B0606020202030204" pitchFamily="34" charset="0"/>
-                          <a:cs typeface="Arial"/>
-                          <a:sym typeface="Arial"/>
-                        </a:rPr>
-                        <a:t>MEJORAMIENTO DEL SERVICIO EDUCATIVO DEL NIVEL SECUNDARIO IES LIBERTADORES DE AMERICA DISTRITO DE CHALHUANCA - PROVINCIA DE AYMARAES - DEPARTAMENTO DE APURIMAC</a:t>
-                      </a:r>
-                    </a:p>
-                  </a:txBody>
-                  <a:tcPr/>
-                </a:tc>
-                <a:tc>
-                  <a:txBody>
-                    <a:bodyPr/>
-                    <a:lstStyle/>
-                    <a:p>
-                      <a:r>
-                        <a:rPr lang="es-PE" sz="1000" b="0" i="0" u="none" strike="noStrike" cap="none" dirty="0">
-                          <a:solidFill>
-                            <a:srgbClr val="000000"/>
-                          </a:solidFill>
-                          <a:latin typeface="Arial Narrow" panose="020B0606020202030204" pitchFamily="34" charset="0"/>
-                          <a:cs typeface="Arial"/>
-                          <a:sym typeface="Arial"/>
-                        </a:rPr>
-                        <a:t>31,411,827.35</a:t>
-                      </a:r>
-                    </a:p>
-                  </a:txBody>
-                  <a:tcPr/>
-                </a:tc>
-                <a:tc>
-                  <a:txBody>
-                    <a:bodyPr/>
-                    <a:lstStyle/>
-                    <a:p>
-                      <a:pPr marL="0" marR="0" lvl="0" indent="0" algn="ctr" defTabSz="914400" rtl="0" eaLnBrk="1" fontAlgn="auto" latinLnBrk="0" hangingPunct="1">
-                        <a:lnSpc>
-                          <a:spcPct val="100000"/>
-                        </a:lnSpc>
-                        <a:spcBef>
-                          <a:spcPts val="0"/>
-                        </a:spcBef>
-                        <a:spcAft>
-                          <a:spcPts val="0"/>
-                        </a:spcAft>
-                        <a:buClr>
-                          <a:srgbClr val="000000"/>
-                        </a:buClr>
-                        <a:buSzTx/>
-                        <a:buFont typeface="Arial"/>
-                        <a:buNone/>
-                        <a:tabLst/>
-                        <a:defRPr/>
-                      </a:pPr>
-                      <a:r>
-                        <a:rPr lang="es-PE" sz="1000" b="0" dirty="0">
-                          <a:solidFill>
-                            <a:schemeClr val="tx1"/>
-                          </a:solidFill>
-                          <a:latin typeface="Arial Narrow" panose="020B0606020202030204" pitchFamily="34" charset="0"/>
-                        </a:rPr>
-                        <a:t>Viable</a:t>
-                      </a:r>
-                    </a:p>
-                  </a:txBody>
-                  <a:tcPr/>
-                </a:tc>
-                <a:tc>
-                  <a:txBody>
-                    <a:bodyPr/>
-                    <a:lstStyle/>
-                    <a:p>
-                      <a:pPr algn="ctr" rtl="0" fontAlgn="ctr"/>
-                      <a:endParaRPr lang="es-PE" sz="1000" b="0" i="0" u="none" strike="noStrike" dirty="0">
-                        <a:solidFill>
-                          <a:srgbClr val="000000"/>
-                        </a:solidFill>
-                        <a:effectLst/>
-                        <a:latin typeface="Arial Narrow" panose="020B0606020202030204" pitchFamily="34" charset="0"/>
-                      </a:endParaRPr>
-                    </a:p>
-                  </a:txBody>
-                  <a:tcPr marL="6772" marR="6772" marT="6772" marB="0" anchor="ctr"/>
-                </a:tc>
-                <a:tc>
-                  <a:txBody>
-                    <a:bodyPr/>
-                    <a:lstStyle/>
-                    <a:p>
-                      <a:pPr marL="171450" marR="0" lvl="0" indent="-171450" algn="l" defTabSz="914400" rtl="0" eaLnBrk="1" fontAlgn="auto" latinLnBrk="0" hangingPunct="1">
-                        <a:lnSpc>
-                          <a:spcPct val="100000"/>
-                        </a:lnSpc>
-                        <a:spcBef>
-                          <a:spcPts val="0"/>
-                        </a:spcBef>
-                        <a:spcAft>
-                          <a:spcPts val="0"/>
-                        </a:spcAft>
-                        <a:buClr>
-                          <a:srgbClr val="000000"/>
-                        </a:buClr>
-                        <a:buSzTx/>
-                        <a:buFont typeface="Arial" panose="020B0604020202020204" pitchFamily="34" charset="0"/>
-                        <a:buChar char="•"/>
-                        <a:tabLst/>
-                        <a:defRPr/>
-                      </a:pPr>
-                      <a:r>
-                        <a:rPr lang="es-PE" sz="1000" b="0" dirty="0">
-                          <a:latin typeface="Arial Narrow" panose="020B0606020202030204" pitchFamily="34" charset="0"/>
-                        </a:rPr>
-                        <a:t>01 IES JEC</a:t>
-                      </a:r>
-                    </a:p>
-                    <a:p>
-                      <a:pPr marL="171450" marR="0" lvl="0" indent="-171450" algn="l" defTabSz="914400" rtl="0" eaLnBrk="1" fontAlgn="auto" latinLnBrk="0" hangingPunct="1">
-                        <a:lnSpc>
-                          <a:spcPct val="100000"/>
-                        </a:lnSpc>
-                        <a:spcBef>
-                          <a:spcPts val="0"/>
-                        </a:spcBef>
-                        <a:spcAft>
-                          <a:spcPts val="0"/>
-                        </a:spcAft>
-                        <a:buClr>
-                          <a:srgbClr val="000000"/>
-                        </a:buClr>
-                        <a:buSzTx/>
-                        <a:buFont typeface="Arial" panose="020B0604020202020204" pitchFamily="34" charset="0"/>
-                        <a:buChar char="•"/>
-                        <a:tabLst/>
-                        <a:defRPr/>
-                      </a:pPr>
-                      <a:r>
-                        <a:rPr lang="es-PE" sz="1000" b="0" dirty="0">
-                          <a:latin typeface="Arial Narrow" panose="020B0606020202030204" pitchFamily="34" charset="0"/>
-                        </a:rPr>
-                        <a:t>253.00 Alumnos</a:t>
-                      </a:r>
-                    </a:p>
-                  </a:txBody>
-                  <a:tcPr/>
-                </a:tc>
-                <a:tc>
-                  <a:txBody>
-                    <a:bodyPr/>
-                    <a:lstStyle/>
-                    <a:p>
-                      <a:pPr algn="l" fontAlgn="ctr"/>
-                      <a:endParaRPr lang="es-PE" sz="1000" b="0" i="0" u="none" strike="noStrike" dirty="0">
-                        <a:solidFill>
-                          <a:srgbClr val="000000"/>
-                        </a:solidFill>
-                        <a:effectLst/>
-                        <a:latin typeface="Arial Narrow" panose="020B0606020202030204" pitchFamily="34" charset="0"/>
-                      </a:endParaRPr>
-                    </a:p>
-                  </a:txBody>
-                  <a:tcPr marL="6772" marR="6772" marT="6772" marB="0" anchor="ctr"/>
-                </a:tc>
-                <a:extLst>
-                  <a:ext uri="{0D108BD9-81ED-4DB2-BD59-A6C34878D82A}">
-                    <a16:rowId xmlns:a16="http://schemas.microsoft.com/office/drawing/2014/main" val="710414143"/>
-                  </a:ext>
-                </a:extLst>
-              </a:tr>
-              <a:tr h="229447">
-                <a:tc>
-                  <a:txBody>
-                    <a:bodyPr/>
-                    <a:lstStyle/>
-                    <a:p>
-                      <a:pPr algn="ctr" fontAlgn="ctr"/>
-                      <a:r>
-                        <a:rPr lang="es-PE" sz="1000" b="0" i="0" u="none" strike="noStrike" dirty="0">
-                          <a:solidFill>
-                            <a:srgbClr val="000000"/>
-                          </a:solidFill>
-                          <a:effectLst/>
-                          <a:latin typeface="Arial Narrow" panose="020B0606020202030204" pitchFamily="34" charset="0"/>
-                        </a:rPr>
-                        <a:t>5</a:t>
-                      </a:r>
-                    </a:p>
-                  </a:txBody>
-                  <a:tcPr marL="6772" marR="6772" marT="6772" marB="0" anchor="ctr"/>
-                </a:tc>
-                <a:tc>
-                  <a:txBody>
-                    <a:bodyPr/>
-                    <a:lstStyle/>
-                    <a:p>
-                      <a:pPr marR="0" algn="ctr" rtl="0">
-                        <a:lnSpc>
-                          <a:spcPct val="100000"/>
-                        </a:lnSpc>
-                        <a:spcBef>
-                          <a:spcPts val="0"/>
-                        </a:spcBef>
-                        <a:spcAft>
-                          <a:spcPts val="0"/>
-                        </a:spcAft>
-                        <a:buClr>
-                          <a:srgbClr val="000000"/>
-                        </a:buClr>
-                        <a:buFont typeface="Arial"/>
-                      </a:pPr>
-                      <a:r>
-                        <a:rPr lang="es-PE" sz="1000" b="0" i="0" u="none" strike="noStrike" cap="none" dirty="0">
-                          <a:solidFill>
-                            <a:srgbClr val="000000"/>
-                          </a:solidFill>
-                          <a:latin typeface="Arial Narrow" panose="020B0606020202030204" pitchFamily="34" charset="0"/>
-                          <a:cs typeface="Arial"/>
-                          <a:sym typeface="Arial"/>
-                        </a:rPr>
-                        <a:t>	</a:t>
-                      </a:r>
-                    </a:p>
-                    <a:p>
-                      <a:pPr marR="0" algn="ctr" rtl="0">
-                        <a:lnSpc>
-                          <a:spcPct val="100000"/>
-                        </a:lnSpc>
-                        <a:spcBef>
-                          <a:spcPts val="0"/>
-                        </a:spcBef>
-                        <a:spcAft>
-                          <a:spcPts val="0"/>
-                        </a:spcAft>
-                        <a:buClr>
-                          <a:srgbClr val="000000"/>
-                        </a:buClr>
-                        <a:buFont typeface="Arial"/>
-                      </a:pPr>
-                      <a:r>
-                        <a:rPr lang="es-PE" sz="1000" b="0" i="0" u="none" strike="noStrike" cap="none" dirty="0">
-                          <a:solidFill>
-                            <a:srgbClr val="000000"/>
-                          </a:solidFill>
-                          <a:latin typeface="Arial Narrow" panose="020B0606020202030204" pitchFamily="34" charset="0"/>
-                          <a:cs typeface="Arial"/>
-                          <a:sym typeface="Arial"/>
-                        </a:rPr>
-                        <a:t>2475965</a:t>
-                      </a:r>
-                    </a:p>
-                  </a:txBody>
-                  <a:tcPr/>
-                </a:tc>
-                <a:tc>
-                  <a:txBody>
-                    <a:bodyPr/>
-                    <a:lstStyle/>
-                    <a:p>
-                      <a:pPr marL="0" marR="0" lvl="0" indent="0" algn="ctr" defTabSz="914400" rtl="0" eaLnBrk="1" fontAlgn="ctr" latinLnBrk="0" hangingPunct="1">
-                        <a:lnSpc>
-                          <a:spcPct val="100000"/>
-                        </a:lnSpc>
-                        <a:spcBef>
-                          <a:spcPts val="0"/>
-                        </a:spcBef>
-                        <a:spcAft>
-                          <a:spcPts val="0"/>
-                        </a:spcAft>
-                        <a:buClrTx/>
-                        <a:buSzTx/>
-                        <a:buFontTx/>
-                        <a:buNone/>
-                        <a:tabLst/>
-                        <a:defRPr/>
-                      </a:pPr>
-                      <a:r>
-                        <a:rPr lang="es-PE" sz="1000" b="0" i="0" u="none" strike="noStrike" dirty="0">
-                          <a:solidFill>
-                            <a:srgbClr val="000000"/>
-                          </a:solidFill>
-                          <a:effectLst/>
-                          <a:latin typeface="Arial Narrow" panose="020B0606020202030204" pitchFamily="34" charset="0"/>
-                        </a:rPr>
-                        <a:t>----</a:t>
-                      </a:r>
-                    </a:p>
-                    <a:p>
-                      <a:pPr algn="ctr" rtl="0" fontAlgn="ctr"/>
-                      <a:endParaRPr lang="es-PE" sz="1000" b="0" i="0" u="none" strike="noStrike" dirty="0">
-                        <a:solidFill>
-                          <a:srgbClr val="000000"/>
-                        </a:solidFill>
-                        <a:effectLst/>
-                        <a:latin typeface="Arial Narrow" panose="020B0606020202030204" pitchFamily="34" charset="0"/>
-                      </a:endParaRPr>
-                    </a:p>
-                  </a:txBody>
-                  <a:tcPr marL="6772" marR="6772" marT="6772" marB="0" anchor="ctr"/>
-                </a:tc>
-                <a:tc>
-                  <a:txBody>
-                    <a:bodyPr/>
-                    <a:lstStyle/>
-                    <a:p>
-                      <a:r>
-                        <a:rPr lang="es-PE" sz="1000" b="0" i="0" u="none" strike="noStrike" cap="none" dirty="0">
-                          <a:solidFill>
-                            <a:srgbClr val="000000"/>
-                          </a:solidFill>
-                          <a:latin typeface="Arial Narrow" panose="020B0606020202030204" pitchFamily="34" charset="0"/>
-                          <a:cs typeface="Arial"/>
-                          <a:sym typeface="Arial"/>
-                        </a:rPr>
-                        <a:t>MEJORAMIENTO DEL SERVICIO EDUCATIVO DEL INSTITUTO DE EDUCACIÓN SUPERIOR TECNOLÓGICO HERMENEGILDO MIRANDA SEGOVIA Y FILIAL JUAN ESPINOZA MEDRANO, DISTRITO DE ANTABAMBA - PROVINCIA DE ANTABAMBA - DEPARTAMENTO DE APURIMAC</a:t>
-                      </a:r>
-                    </a:p>
-                  </a:txBody>
-                  <a:tcPr/>
-                </a:tc>
-                <a:tc>
-                  <a:txBody>
-                    <a:bodyPr/>
-                    <a:lstStyle/>
-                    <a:p>
-                      <a:r>
-                        <a:rPr lang="es-PE" sz="1000" b="0" i="0" u="none" strike="noStrike" cap="none" dirty="0">
-                          <a:solidFill>
-                            <a:srgbClr val="000000"/>
-                          </a:solidFill>
-                          <a:latin typeface="Arial Narrow" panose="020B0606020202030204" pitchFamily="34" charset="0"/>
-                          <a:cs typeface="Arial"/>
-                          <a:sym typeface="Arial"/>
-                        </a:rPr>
-                        <a:t>40,159,160.79</a:t>
-                      </a:r>
-                    </a:p>
-                  </a:txBody>
-                  <a:tcPr/>
-                </a:tc>
-                <a:tc>
-                  <a:txBody>
-                    <a:bodyPr/>
-                    <a:lstStyle/>
-                    <a:p>
-                      <a:pPr marL="0" marR="0" lvl="0" indent="0" algn="ctr" defTabSz="914400" rtl="0" eaLnBrk="1" fontAlgn="auto" latinLnBrk="0" hangingPunct="1">
-                        <a:lnSpc>
-                          <a:spcPct val="100000"/>
-                        </a:lnSpc>
-                        <a:spcBef>
-                          <a:spcPts val="0"/>
-                        </a:spcBef>
-                        <a:spcAft>
-                          <a:spcPts val="0"/>
-                        </a:spcAft>
-                        <a:buClr>
-                          <a:srgbClr val="000000"/>
-                        </a:buClr>
-                        <a:buSzTx/>
-                        <a:buFont typeface="Arial"/>
-                        <a:buNone/>
-                        <a:tabLst/>
-                        <a:defRPr/>
-                      </a:pPr>
-                      <a:r>
-                        <a:rPr lang="es-PE" sz="1000" b="0" dirty="0">
-                          <a:solidFill>
-                            <a:schemeClr val="tx1"/>
-                          </a:solidFill>
-                          <a:latin typeface="Arial Narrow" panose="020B0606020202030204" pitchFamily="34" charset="0"/>
-                        </a:rPr>
-                        <a:t>Viable</a:t>
-                      </a:r>
-                    </a:p>
-                  </a:txBody>
-                  <a:tcPr/>
-                </a:tc>
-                <a:tc>
-                  <a:txBody>
-                    <a:bodyPr/>
-                    <a:lstStyle/>
-                    <a:p>
-                      <a:pPr algn="ctr" rtl="0" fontAlgn="ctr"/>
-                      <a:endParaRPr lang="es-PE" sz="1000" b="0" i="0" u="none" strike="noStrike" dirty="0">
-                        <a:solidFill>
-                          <a:srgbClr val="000000"/>
-                        </a:solidFill>
-                        <a:effectLst/>
-                        <a:latin typeface="Arial Narrow" panose="020B0606020202030204" pitchFamily="34" charset="0"/>
-                      </a:endParaRPr>
-                    </a:p>
-                  </a:txBody>
-                  <a:tcPr marL="6772" marR="6772" marT="6772" marB="0" anchor="ctr"/>
-                </a:tc>
-                <a:tc>
-                  <a:txBody>
-                    <a:bodyPr/>
-                    <a:lstStyle/>
-                    <a:p>
-                      <a:pPr marL="171450" marR="0" lvl="0" indent="-171450" algn="l" defTabSz="914400" rtl="0" eaLnBrk="1" fontAlgn="auto" latinLnBrk="0" hangingPunct="1">
-                        <a:lnSpc>
-                          <a:spcPct val="100000"/>
-                        </a:lnSpc>
-                        <a:spcBef>
-                          <a:spcPts val="0"/>
-                        </a:spcBef>
-                        <a:spcAft>
-                          <a:spcPts val="0"/>
-                        </a:spcAft>
-                        <a:buClr>
-                          <a:srgbClr val="000000"/>
-                        </a:buClr>
-                        <a:buSzTx/>
-                        <a:buFont typeface="Arial" panose="020B0604020202020204" pitchFamily="34" charset="0"/>
-                        <a:buChar char="•"/>
-                        <a:tabLst/>
-                        <a:defRPr/>
-                      </a:pPr>
-                      <a:r>
-                        <a:rPr lang="es-PE" sz="1000" b="0" i="0" u="none" strike="noStrike" cap="none" dirty="0">
-                          <a:solidFill>
-                            <a:schemeClr val="tx1"/>
-                          </a:solidFill>
-                          <a:latin typeface="Arial Narrow" panose="020B0606020202030204" pitchFamily="34" charset="0"/>
-                          <a:ea typeface="+mn-ea"/>
-                          <a:cs typeface="+mn-cs"/>
-                          <a:sym typeface="Arial"/>
-                        </a:rPr>
-                        <a:t>352 Alumnos </a:t>
-                      </a:r>
-                    </a:p>
-                  </a:txBody>
-                  <a:tcPr/>
-                </a:tc>
-                <a:tc>
-                  <a:txBody>
-                    <a:bodyPr/>
-                    <a:lstStyle/>
-                    <a:p>
-                      <a:pPr algn="l" fontAlgn="ctr"/>
-                      <a:endParaRPr lang="es-PE" sz="1000" b="0" i="0" u="none" strike="noStrike" dirty="0">
-                        <a:solidFill>
-                          <a:srgbClr val="000000"/>
-                        </a:solidFill>
-                        <a:effectLst/>
-                        <a:latin typeface="Arial Narrow" panose="020B0606020202030204" pitchFamily="34" charset="0"/>
-                      </a:endParaRPr>
-                    </a:p>
-                  </a:txBody>
-                  <a:tcPr marL="6772" marR="6772" marT="6772" marB="0" anchor="ctr"/>
-                </a:tc>
-                <a:extLst>
-                  <a:ext uri="{0D108BD9-81ED-4DB2-BD59-A6C34878D82A}">
-                    <a16:rowId xmlns:a16="http://schemas.microsoft.com/office/drawing/2014/main" val="379476171"/>
-                  </a:ext>
-                </a:extLst>
-              </a:tr>
-              <a:tr h="229447">
-                <a:tc>
-                  <a:txBody>
-                    <a:bodyPr/>
-                    <a:lstStyle/>
-                    <a:p>
-                      <a:pPr algn="ctr" fontAlgn="ctr"/>
-                      <a:r>
-                        <a:rPr lang="es-PE" sz="1000" b="0" i="0" u="none" strike="noStrike" dirty="0">
-                          <a:solidFill>
-                            <a:srgbClr val="000000"/>
-                          </a:solidFill>
-                          <a:effectLst/>
-                          <a:latin typeface="Arial Narrow" panose="020B0606020202030204" pitchFamily="34" charset="0"/>
-                        </a:rPr>
-                        <a:t>6</a:t>
-                      </a:r>
-                    </a:p>
-                  </a:txBody>
-                  <a:tcPr marL="6772" marR="6772" marT="6772" marB="0" anchor="ctr"/>
-                </a:tc>
-                <a:tc>
-                  <a:txBody>
-                    <a:bodyPr/>
-                    <a:lstStyle/>
-                    <a:p>
-                      <a:pPr marR="0" algn="ctr" rtl="0">
-                        <a:lnSpc>
-                          <a:spcPct val="100000"/>
-                        </a:lnSpc>
-                        <a:spcBef>
-                          <a:spcPts val="0"/>
-                        </a:spcBef>
-                        <a:spcAft>
-                          <a:spcPts val="0"/>
-                        </a:spcAft>
-                        <a:buClr>
-                          <a:srgbClr val="000000"/>
-                        </a:buClr>
-                        <a:buFont typeface="Arial"/>
-                      </a:pPr>
-                      <a:r>
-                        <a:rPr lang="es-PE" sz="1000" b="0" i="0" u="none" strike="noStrike" cap="none" dirty="0">
-                          <a:solidFill>
-                            <a:srgbClr val="000000"/>
-                          </a:solidFill>
-                          <a:latin typeface="Arial Narrow" panose="020B0606020202030204" pitchFamily="34" charset="0"/>
-                          <a:cs typeface="Arial"/>
-                          <a:sym typeface="Arial"/>
-                        </a:rPr>
-                        <a:t>2467981</a:t>
-                      </a:r>
-                    </a:p>
-                  </a:txBody>
-                  <a:tcPr/>
-                </a:tc>
-                <a:tc>
-                  <a:txBody>
-                    <a:bodyPr/>
-                    <a:lstStyle/>
-                    <a:p>
-                      <a:pPr marL="0" marR="0" lvl="0" indent="0" algn="ctr" defTabSz="914400" rtl="0" eaLnBrk="1" fontAlgn="ctr" latinLnBrk="0" hangingPunct="1">
-                        <a:lnSpc>
-                          <a:spcPct val="100000"/>
-                        </a:lnSpc>
-                        <a:spcBef>
-                          <a:spcPts val="0"/>
-                        </a:spcBef>
-                        <a:spcAft>
-                          <a:spcPts val="0"/>
-                        </a:spcAft>
-                        <a:buClrTx/>
-                        <a:buSzTx/>
-                        <a:buFontTx/>
-                        <a:buNone/>
-                        <a:tabLst/>
-                        <a:defRPr/>
-                      </a:pPr>
-                      <a:r>
-                        <a:rPr lang="es-PE" sz="1000" b="0" i="0" u="none" strike="noStrike" dirty="0">
-                          <a:solidFill>
-                            <a:srgbClr val="000000"/>
-                          </a:solidFill>
-                          <a:effectLst/>
-                          <a:latin typeface="Arial Narrow" panose="020B0606020202030204" pitchFamily="34" charset="0"/>
-                        </a:rPr>
-                        <a:t>----</a:t>
-                      </a:r>
-                    </a:p>
-                    <a:p>
-                      <a:pPr algn="ctr" rtl="0" fontAlgn="ctr"/>
-                      <a:endParaRPr lang="es-PE" sz="1000" b="0" i="0" u="none" strike="noStrike" dirty="0">
-                        <a:solidFill>
-                          <a:srgbClr val="000000"/>
-                        </a:solidFill>
-                        <a:effectLst/>
-                        <a:latin typeface="Arial Narrow" panose="020B0606020202030204" pitchFamily="34" charset="0"/>
-                      </a:endParaRPr>
-                    </a:p>
-                  </a:txBody>
-                  <a:tcPr marL="6772" marR="6772" marT="6772" marB="0" anchor="ctr"/>
-                </a:tc>
-                <a:tc>
-                  <a:txBody>
-                    <a:bodyPr/>
-                    <a:lstStyle/>
-                    <a:p>
-                      <a:r>
-                        <a:rPr lang="es-PE" sz="1000" b="0" i="0" u="none" strike="noStrike" cap="none" dirty="0">
-                          <a:solidFill>
-                            <a:srgbClr val="000000"/>
-                          </a:solidFill>
-                          <a:latin typeface="Arial Narrow" panose="020B0606020202030204" pitchFamily="34" charset="0"/>
-                          <a:cs typeface="Arial"/>
-                          <a:sym typeface="Arial"/>
-                        </a:rPr>
-                        <a:t>MEJORAMIENTO DEL SERVICIO DE GESTIÓN PEDAGÓGICA Y ADMINISTRATIVA DE LAS REDES EDUCATIVAS CON ENFOQUE DE INNOVACION E INVESTIGACION PARA LA MEJORA DE LOS APRENDIZAJES EN LA UGEL DE LAS PROVINCIAS DE COTABAMBAS Y GRAU DEL DEPARTAMENTO DE APURIMAC</a:t>
-                      </a:r>
-                    </a:p>
-                  </a:txBody>
-                  <a:tcPr/>
-                </a:tc>
-                <a:tc>
-                  <a:txBody>
-                    <a:bodyPr/>
-                    <a:lstStyle/>
-                    <a:p>
-                      <a:r>
-                        <a:rPr lang="es-PE" sz="1000" b="0" i="0" u="none" strike="noStrike" cap="none" dirty="0">
-                          <a:solidFill>
-                            <a:srgbClr val="000000"/>
-                          </a:solidFill>
-                          <a:latin typeface="Arial Narrow" panose="020B0606020202030204" pitchFamily="34" charset="0"/>
-                          <a:cs typeface="Arial"/>
-                          <a:sym typeface="Arial"/>
-                        </a:rPr>
-                        <a:t>13,103,362.94</a:t>
-                      </a:r>
-                    </a:p>
-                  </a:txBody>
-                  <a:tcPr/>
-                </a:tc>
-                <a:tc>
-                  <a:txBody>
-                    <a:bodyPr/>
-                    <a:lstStyle/>
-                    <a:p>
-                      <a:pPr marL="0" marR="0" lvl="0" indent="0" algn="ctr" defTabSz="914400" rtl="0" eaLnBrk="1" fontAlgn="auto" latinLnBrk="0" hangingPunct="1">
-                        <a:lnSpc>
-                          <a:spcPct val="100000"/>
-                        </a:lnSpc>
-                        <a:spcBef>
-                          <a:spcPts val="0"/>
-                        </a:spcBef>
-                        <a:spcAft>
-                          <a:spcPts val="0"/>
-                        </a:spcAft>
-                        <a:buClr>
-                          <a:srgbClr val="000000"/>
-                        </a:buClr>
-                        <a:buSzTx/>
-                        <a:buFont typeface="Arial"/>
-                        <a:buNone/>
-                        <a:tabLst/>
-                        <a:defRPr/>
-                      </a:pPr>
-                      <a:r>
-                        <a:rPr lang="es-PE" sz="1000" b="0" dirty="0">
-                          <a:solidFill>
-                            <a:schemeClr val="tx1"/>
-                          </a:solidFill>
-                          <a:latin typeface="Arial Narrow" panose="020B0606020202030204" pitchFamily="34" charset="0"/>
-                        </a:rPr>
-                        <a:t>Viable</a:t>
-                      </a:r>
-                    </a:p>
-                  </a:txBody>
-                  <a:tcPr/>
-                </a:tc>
-                <a:tc>
-                  <a:txBody>
-                    <a:bodyPr/>
-                    <a:lstStyle/>
-                    <a:p>
-                      <a:pPr algn="ctr" rtl="0" fontAlgn="ctr"/>
-                      <a:endParaRPr lang="es-PE" sz="1000" b="0" i="0" u="none" strike="noStrike" dirty="0">
-                        <a:solidFill>
-                          <a:srgbClr val="000000"/>
-                        </a:solidFill>
-                        <a:effectLst/>
-                        <a:latin typeface="Arial Narrow" panose="020B0606020202030204" pitchFamily="34" charset="0"/>
-                      </a:endParaRPr>
-                    </a:p>
-                  </a:txBody>
-                  <a:tcPr marL="6772" marR="6772" marT="6772" marB="0" anchor="ctr"/>
-                </a:tc>
-                <a:tc>
-                  <a:txBody>
-                    <a:bodyPr/>
-                    <a:lstStyle/>
-                    <a:p>
-                      <a:pPr marL="171450" marR="0" lvl="0" indent="-171450" algn="l" defTabSz="914400" rtl="0" eaLnBrk="1" fontAlgn="auto" latinLnBrk="0" hangingPunct="1">
-                        <a:lnSpc>
-                          <a:spcPct val="100000"/>
-                        </a:lnSpc>
-                        <a:spcBef>
-                          <a:spcPts val="0"/>
-                        </a:spcBef>
-                        <a:spcAft>
-                          <a:spcPts val="0"/>
-                        </a:spcAft>
-                        <a:buClr>
-                          <a:srgbClr val="000000"/>
-                        </a:buClr>
-                        <a:buSzTx/>
-                        <a:buFont typeface="Arial" panose="020B0604020202020204" pitchFamily="34" charset="0"/>
-                        <a:buChar char="•"/>
-                        <a:tabLst/>
-                        <a:defRPr/>
-                      </a:pPr>
-                      <a:r>
-                        <a:rPr lang="es-PE" sz="1000" b="0" i="0" u="none" strike="noStrike" cap="none" dirty="0">
-                          <a:solidFill>
-                            <a:schemeClr val="tx1"/>
-                          </a:solidFill>
-                          <a:latin typeface="Arial Narrow" panose="020B0606020202030204" pitchFamily="34" charset="0"/>
-                          <a:ea typeface="+mn-ea"/>
-                          <a:cs typeface="+mn-cs"/>
-                          <a:sym typeface="Arial"/>
-                        </a:rPr>
-                        <a:t>1,049.00 docentes</a:t>
-                      </a:r>
-                    </a:p>
-                  </a:txBody>
-                  <a:tcPr/>
-                </a:tc>
-                <a:tc>
-                  <a:txBody>
-                    <a:bodyPr/>
-                    <a:lstStyle/>
-                    <a:p>
-                      <a:pPr algn="l" fontAlgn="ctr"/>
-                      <a:endParaRPr lang="es-PE" sz="1000" b="0" i="0" u="none" strike="noStrike" dirty="0">
-                        <a:solidFill>
-                          <a:srgbClr val="000000"/>
-                        </a:solidFill>
-                        <a:effectLst/>
-                        <a:latin typeface="Arial Narrow" panose="020B0606020202030204" pitchFamily="34" charset="0"/>
-                      </a:endParaRPr>
-                    </a:p>
-                  </a:txBody>
-                  <a:tcPr marL="6772" marR="6772" marT="6772" marB="0" anchor="ctr"/>
-                </a:tc>
-                <a:extLst>
-                  <a:ext uri="{0D108BD9-81ED-4DB2-BD59-A6C34878D82A}">
-                    <a16:rowId xmlns:a16="http://schemas.microsoft.com/office/drawing/2014/main" val="3039650923"/>
-                  </a:ext>
-                </a:extLst>
-              </a:tr>
             </a:tbl>
           </a:graphicData>
         </a:graphic>
@@ -7229,8 +5953,8 @@
         </p:nvSpPr>
         <p:spPr>
           <a:xfrm>
-            <a:off x="3968767" y="699108"/>
-            <a:ext cx="3841697" cy="602007"/>
+            <a:off x="516943" y="699108"/>
+            <a:ext cx="10051530" cy="602007"/>
           </a:xfrm>
           <a:prstGeom prst="rect">
             <a:avLst/>
@@ -7523,7 +6247,7 @@
                 <a:ea typeface="+mj-ea"/>
                 <a:cs typeface="+mj-cs"/>
               </a:rPr>
-              <a:t>Función EDUCACION</a:t>
+              <a:t>Función CULTURA Y DEPORTE, FUNCION PROTECCION SOCIAL</a:t>
             </a:r>
           </a:p>
         </p:txBody>
@@ -7644,14 +6368,14 @@
           <p:nvPr>
             <p:extLst>
               <p:ext uri="{D42A27DB-BD31-4B8C-83A1-F6EECF244321}">
-                <p14:modId xmlns:p14="http://schemas.microsoft.com/office/powerpoint/2010/main" val="2507926243"/>
+                <p14:modId xmlns:p14="http://schemas.microsoft.com/office/powerpoint/2010/main" val="3737850889"/>
               </p:ext>
             </p:extLst>
           </p:nvPr>
         </p:nvGraphicFramePr>
         <p:xfrm>
           <a:off x="265958" y="1301115"/>
-          <a:ext cx="11773087" cy="5383463"/>
+          <a:ext cx="10295152" cy="3236430"/>
         </p:xfrm>
         <a:graphic>
           <a:graphicData uri="http://schemas.openxmlformats.org/drawingml/2006/table">
@@ -7660,31 +6384,17 @@
                 <a:tableStyleId>{E8B1032C-EA38-4F05-BA0D-38AFFFC7BED3}</a:tableStyleId>
               </a:tblPr>
               <a:tblGrid>
-                <a:gridCol w="445514">
+                <a:gridCol w="372869">
                   <a:extLst>
                     <a:ext uri="{9D8B030D-6E8A-4147-A177-3AD203B41FA5}">
                       <a16:colId xmlns:a16="http://schemas.microsoft.com/office/drawing/2014/main" val="1149053298"/>
                     </a:ext>
                   </a:extLst>
                 </a:gridCol>
-                <a:gridCol w="504872">
-                  <a:extLst>
-                    <a:ext uri="{9D8B030D-6E8A-4147-A177-3AD203B41FA5}">
-                      <a16:colId xmlns:a16="http://schemas.microsoft.com/office/drawing/2014/main" val="3265136901"/>
-                    </a:ext>
-                  </a:extLst>
-                </a:gridCol>
-                <a:gridCol w="804970">
+                <a:gridCol w="643556">
                   <a:extLst>
                     <a:ext uri="{9D8B030D-6E8A-4147-A177-3AD203B41FA5}">
                       <a16:colId xmlns:a16="http://schemas.microsoft.com/office/drawing/2014/main" val="541476674"/>
-                    </a:ext>
-                  </a:extLst>
-                </a:gridCol>
-                <a:gridCol w="739004">
-                  <a:extLst>
-                    <a:ext uri="{9D8B030D-6E8A-4147-A177-3AD203B41FA5}">
-                      <a16:colId xmlns:a16="http://schemas.microsoft.com/office/drawing/2014/main" val="2809815218"/>
                     </a:ext>
                   </a:extLst>
                 </a:gridCol>
@@ -7769,61 +6479,7 @@
                         <a:rPr lang="es-PE" sz="1100" b="1" u="none" strike="noStrike" dirty="0">
                           <a:effectLst/>
                         </a:rPr>
-                        <a:t>CUI</a:t>
-                      </a:r>
-                      <a:endParaRPr lang="es-PE" sz="1100" b="1" i="0" u="none" strike="noStrike" dirty="0">
-                        <a:solidFill>
-                          <a:srgbClr val="000000"/>
-                        </a:solidFill>
-                        <a:effectLst/>
-                        <a:latin typeface="Arial Narrow" panose="020B0606020202030204" pitchFamily="34" charset="0"/>
-                      </a:endParaRPr>
-                    </a:p>
-                  </a:txBody>
-                  <a:tcPr marL="6772" marR="6772" marT="6772" marB="0" anchor="ctr">
-                    <a:solidFill>
-                      <a:schemeClr val="accent5"/>
-                    </a:solidFill>
-                  </a:tcPr>
-                </a:tc>
-                <a:tc>
-                  <a:txBody>
-                    <a:bodyPr/>
-                    <a:lstStyle/>
-                    <a:p>
-                      <a:pPr algn="ctr" rtl="0" fontAlgn="ctr"/>
-                      <a:r>
-                        <a:rPr lang="es-PE" sz="1100" b="1" u="none" strike="noStrike" dirty="0">
-                          <a:effectLst/>
-                        </a:rPr>
                         <a:t>CÓDIGO DE IDEA</a:t>
-                      </a:r>
-                      <a:endParaRPr lang="es-PE" sz="1100" b="1" i="0" u="none" strike="noStrike" dirty="0">
-                        <a:solidFill>
-                          <a:srgbClr val="000000"/>
-                        </a:solidFill>
-                        <a:effectLst/>
-                        <a:latin typeface="Arial Narrow" panose="020B0606020202030204" pitchFamily="34" charset="0"/>
-                      </a:endParaRPr>
-                    </a:p>
-                  </a:txBody>
-                  <a:tcPr marL="6772" marR="6772" marT="6772" marB="0" anchor="ctr">
-                    <a:solidFill>
-                      <a:schemeClr val="accent5"/>
-                    </a:solidFill>
-                  </a:tcPr>
-                </a:tc>
-                <a:tc>
-                  <a:txBody>
-                    <a:bodyPr/>
-                    <a:lstStyle/>
-                    <a:p>
-                      <a:pPr algn="ctr" rtl="0" fontAlgn="ctr"/>
-                      <a:r>
-                        <a:rPr lang="es-PE" sz="1100" b="1" u="none" strike="noStrike" dirty="0">
-                          <a:effectLst/>
-                        </a:rPr>
-                        <a:t>FUNCIÓN</a:t>
                       </a:r>
                       <a:endParaRPr lang="es-PE" sz="1100" b="1" i="0" u="none" strike="noStrike" dirty="0">
                         <a:solidFill>
@@ -8057,61 +6713,8 @@
                           <a:effectLst/>
                           <a:latin typeface="Arial Narrow" panose="020B0606020202030204" pitchFamily="34" charset="0"/>
                         </a:rPr>
-                        <a:t>----</a:t>
+                        <a:t>49565</a:t>
                       </a:r>
-                    </a:p>
-                  </a:txBody>
-                  <a:tcPr marL="6772" marR="6772" marT="6772" marB="0" anchor="ctr"/>
-                </a:tc>
-                <a:tc>
-                  <a:txBody>
-                    <a:bodyPr/>
-                    <a:lstStyle/>
-                    <a:p>
-                      <a:pPr algn="ctr" rtl="0" fontAlgn="ctr"/>
-                      <a:r>
-                        <a:rPr lang="es-PE" sz="1000" b="0" i="0" u="none" strike="noStrike" dirty="0">
-                          <a:solidFill>
-                            <a:srgbClr val="000000"/>
-                          </a:solidFill>
-                          <a:effectLst/>
-                          <a:latin typeface="Arial Narrow" panose="020B0606020202030204" pitchFamily="34" charset="0"/>
-                        </a:rPr>
-                        <a:t>49265</a:t>
-                      </a:r>
-                    </a:p>
-                  </a:txBody>
-                  <a:tcPr marL="6772" marR="6772" marT="6772" marB="0" anchor="ctr"/>
-                </a:tc>
-                <a:tc>
-                  <a:txBody>
-                    <a:bodyPr/>
-                    <a:lstStyle/>
-                    <a:p>
-                      <a:pPr algn="l" rtl="0" fontAlgn="ctr"/>
-                      <a:r>
-                        <a:rPr lang="es-PE" sz="1000" b="0" i="0" u="none" strike="noStrike" dirty="0" err="1">
-                          <a:solidFill>
-                            <a:srgbClr val="000000"/>
-                          </a:solidFill>
-                          <a:effectLst/>
-                          <a:highlight>
-                            <a:srgbClr val="FF0000"/>
-                          </a:highlight>
-                          <a:latin typeface="Arial Narrow" panose="020B0606020202030204" pitchFamily="34" charset="0"/>
-                        </a:rPr>
-                        <a:t>Educacion</a:t>
-                      </a:r>
-                      <a:endParaRPr lang="es-PE" sz="1000" b="0" i="0" u="none" strike="noStrike" dirty="0">
-                        <a:solidFill>
-                          <a:srgbClr val="000000"/>
-                        </a:solidFill>
-                        <a:effectLst/>
-                        <a:highlight>
-                          <a:srgbClr val="FF0000"/>
-                        </a:highlight>
-                        <a:latin typeface="Arial Narrow" panose="020B0606020202030204" pitchFamily="34" charset="0"/>
-                      </a:endParaRPr>
                     </a:p>
                   </a:txBody>
                   <a:tcPr marL="6772" marR="6772" marT="6772" marB="0" anchor="ctr"/>
@@ -8141,15 +6744,9 @@
                         <a:defRPr/>
                       </a:pPr>
                       <a:r>
-                        <a:rPr lang="es-PE" sz="1000" b="0" dirty="0">
-                          <a:latin typeface="Arial Narrow" panose="020B0606020202030204" pitchFamily="34" charset="0"/>
-                          <a:hlinkClick r:id="" action="ppaction://noaction"/>
-                        </a:rPr>
-                        <a:t>MEJORAMIENTO DEL SERVICIO EDUCATIVO DEL NIVEL INICIAL N° 1105, N°92 - REYNA DE LOS ANGELES, N°1106, 812 SAN JUAN DE DIOS Y N°79 CRISTO REDENTOR EN LOS DISTRITOS DE ABANCAY , CURAHUASI Y SAN PEDRO DE CACHORA DE LA PROVINCIA DE ABANCAY - DEPARTAMENTO DE APURIMAC</a:t>
+                        <a:rPr lang="es-PE" sz="800" b="0" dirty="0"/>
+                        <a:t>MEJORAMIENTO DE LOS SERVICIOS DE ALIMENTACIÓN ESCOLAR EN LAS INSTITUCIONES EDUCATIVAS INICIALES Y PRIMARIAS DE LOS DISTRITOS DE EXTREMA POBREZA EN 4 PROVINCIAS DEL DEPARTAMENTO DE APURIMAC</a:t>
                       </a:r>
-                      <a:endParaRPr lang="es-PE" sz="1000" b="0" dirty="0">
-                        <a:latin typeface="Arial Narrow" panose="020B0606020202030204" pitchFamily="34" charset="0"/>
-                      </a:endParaRPr>
                     </a:p>
                   </a:txBody>
                   <a:tcPr/>
@@ -8179,20 +6776,9 @@
                         <a:defRPr/>
                       </a:pPr>
                       <a:r>
-                        <a:rPr lang="es-PE" sz="1000" b="1" i="0" u="none" strike="noStrike" cap="none" dirty="0">
-                          <a:solidFill>
-                            <a:schemeClr val="tx1"/>
-                          </a:solidFill>
-                          <a:latin typeface="Arial Narrow" panose="020B0606020202030204" pitchFamily="34" charset="0"/>
-                          <a:ea typeface="+mn-ea"/>
-                          <a:cs typeface="+mn-cs"/>
-                          <a:sym typeface="Arial"/>
-                        </a:rPr>
-                        <a:t>6,870,000.00</a:t>
+                        <a:rPr lang="es-PE" sz="800" b="0" dirty="0"/>
+                        <a:t>2,313,489	</a:t>
                       </a:r>
-                      <a:endParaRPr lang="es-PE" sz="1000" b="0" dirty="0">
-                        <a:latin typeface="Arial Narrow" panose="020B0606020202030204" pitchFamily="34" charset="0"/>
-                      </a:endParaRPr>
                     </a:p>
                   </a:txBody>
                   <a:tcPr/>
@@ -8222,9 +6808,7 @@
                         <a:defRPr/>
                       </a:pPr>
                       <a:r>
-                        <a:rPr lang="es-PE" sz="1000" b="0" dirty="0">
-                          <a:latin typeface="Arial Narrow" panose="020B0606020202030204" pitchFamily="34" charset="0"/>
-                        </a:rPr>
+                        <a:rPr lang="es-PE" sz="800" b="0" dirty="0"/>
                         <a:t>Idea</a:t>
                       </a:r>
                     </a:p>
@@ -8256,10 +6840,8 @@
                         <a:defRPr/>
                       </a:pPr>
                       <a:r>
-                        <a:rPr lang="es-PE" sz="1000" b="0" dirty="0">
-                          <a:latin typeface="Arial Narrow" panose="020B0606020202030204" pitchFamily="34" charset="0"/>
-                        </a:rPr>
-                        <a:t>03 meses</a:t>
+                        <a:rPr lang="es-PE" sz="800" b="0" dirty="0"/>
+                        <a:t>3 meses</a:t>
                       </a:r>
                     </a:p>
                   </a:txBody>
@@ -8290,62 +6872,24 @@
                         <a:defRPr/>
                       </a:pPr>
                       <a:r>
-                        <a:rPr lang="es-PE" sz="1000" b="0" dirty="0">
-                          <a:latin typeface="Arial Narrow" panose="020B0606020202030204" pitchFamily="34" charset="0"/>
+                        <a:rPr lang="es-PE" sz="800" b="0" i="0" u="none" strike="noStrike" cap="none" dirty="0" err="1">
+                          <a:solidFill>
+                            <a:srgbClr val="000000"/>
+                          </a:solidFill>
+                          <a:latin typeface="Arial"/>
+                          <a:cs typeface="Arial"/>
+                          <a:sym typeface="Arial"/>
                         </a:rPr>
-                        <a:t>05 II.EE. 270 Alum</a:t>
+                        <a:t>Multiprovincial</a:t>
                       </a:r>
-                    </a:p>
-                    <a:p>
-                      <a:pPr marL="171450" marR="0" lvl="0" indent="-171450" algn="l" defTabSz="914400" rtl="0" eaLnBrk="1" fontAlgn="auto" latinLnBrk="0" hangingPunct="1">
-                        <a:lnSpc>
-                          <a:spcPct val="100000"/>
-                        </a:lnSpc>
-                        <a:spcBef>
-                          <a:spcPts val="0"/>
-                        </a:spcBef>
-                        <a:spcAft>
-                          <a:spcPts val="0"/>
-                        </a:spcAft>
-                        <a:buClr>
+                      <a:endParaRPr lang="es-PE" sz="800" b="0" i="0" u="none" strike="noStrike" cap="none" dirty="0">
+                        <a:solidFill>
                           <a:srgbClr val="000000"/>
-                        </a:buClr>
-                        <a:buSzTx/>
-                        <a:buFont typeface="Arial" panose="020B0604020202020204" pitchFamily="34" charset="0"/>
-                        <a:buChar char="•"/>
-                        <a:tabLst/>
-                        <a:defRPr/>
-                      </a:pPr>
-                      <a:endParaRPr lang="es-PE" sz="1000" b="0" dirty="0">
-                        <a:latin typeface="Arial Narrow" panose="020B0606020202030204" pitchFamily="34" charset="0"/>
+                        </a:solidFill>
+                        <a:latin typeface="Arial"/>
+                        <a:cs typeface="Arial"/>
+                        <a:sym typeface="Arial"/>
                       </a:endParaRPr>
-                    </a:p>
-                    <a:p>
-                      <a:pPr marL="171450" marR="0" lvl="0" indent="-171450" algn="l" defTabSz="914400" rtl="0" eaLnBrk="1" fontAlgn="auto" latinLnBrk="0" hangingPunct="1">
-                        <a:lnSpc>
-                          <a:spcPct val="100000"/>
-                        </a:lnSpc>
-                        <a:spcBef>
-                          <a:spcPts val="0"/>
-                        </a:spcBef>
-                        <a:spcAft>
-                          <a:spcPts val="0"/>
-                        </a:spcAft>
-                        <a:buClr>
-                          <a:srgbClr val="000000"/>
-                        </a:buClr>
-                        <a:buSzTx/>
-                        <a:buFont typeface="Arial" panose="020B0604020202020204" pitchFamily="34" charset="0"/>
-                        <a:buChar char="•"/>
-                        <a:tabLst/>
-                        <a:defRPr/>
-                      </a:pPr>
-                      <a:r>
-                        <a:rPr lang="es-PE" sz="1000" b="0" dirty="0">
-                          <a:latin typeface="Arial Narrow" panose="020B0606020202030204" pitchFamily="34" charset="0"/>
-                        </a:rPr>
-                        <a:t>TDR en revisión</a:t>
-                      </a:r>
                     </a:p>
                   </a:txBody>
                   <a:tcPr/>
@@ -8355,30 +6899,16 @@
                     <a:bodyPr/>
                     <a:lstStyle/>
                     <a:p>
-                      <a:pPr marL="0" marR="0" lvl="0" indent="0" algn="l" defTabSz="914400" rtl="0" eaLnBrk="1" fontAlgn="auto" latinLnBrk="0" hangingPunct="1">
-                        <a:lnSpc>
-                          <a:spcPct val="100000"/>
-                        </a:lnSpc>
-                        <a:spcBef>
-                          <a:spcPts val="0"/>
-                        </a:spcBef>
-                        <a:spcAft>
-                          <a:spcPts val="0"/>
-                        </a:spcAft>
-                        <a:buClr>
-                          <a:srgbClr val="000000"/>
-                        </a:buClr>
-                        <a:buSzTx/>
-                        <a:buFont typeface="Arial" panose="020B0604020202020204" pitchFamily="34" charset="0"/>
-                        <a:buNone/>
-                        <a:tabLst/>
-                        <a:defRPr/>
-                      </a:pPr>
                       <a:r>
-                        <a:rPr lang="es-PE" sz="1000" b="0" dirty="0">
-                          <a:latin typeface="Arial Narrow" panose="020B0606020202030204" pitchFamily="34" charset="0"/>
+                        <a:rPr lang="es-PE" sz="800" b="0" i="0" u="none" strike="noStrike" cap="none" dirty="0">
+                          <a:solidFill>
+                            <a:srgbClr val="000000"/>
+                          </a:solidFill>
+                          <a:latin typeface="+mn-lt"/>
+                          <a:cs typeface="Arial"/>
+                          <a:sym typeface="Arial"/>
                         </a:rPr>
-                        <a:t>Contrata</a:t>
+                        <a:t>Por definir</a:t>
                       </a:r>
                     </a:p>
                   </a:txBody>
@@ -8412,23 +6942,16 @@
                         <a:buFont typeface="Arial"/>
                       </a:pPr>
                       <a:r>
-                        <a:rPr lang="es-PE" sz="1000" b="0" u="none" strike="noStrike" cap="none" dirty="0">
+                        <a:rPr lang="es-PE" sz="1000" b="0" i="0" u="none" strike="noStrike" cap="none" dirty="0">
                           <a:solidFill>
                             <a:srgbClr val="000000"/>
                           </a:solidFill>
                           <a:latin typeface="Arial Narrow" panose="020B0606020202030204" pitchFamily="34" charset="0"/>
+                          <a:cs typeface="Arial"/>
                           <a:sym typeface="Arial"/>
                         </a:rPr>
                         <a:t>2</a:t>
                       </a:r>
-                      <a:endParaRPr lang="es-PE" sz="1000" b="0" i="0" u="none" strike="noStrike" cap="none" dirty="0">
-                        <a:solidFill>
-                          <a:srgbClr val="000000"/>
-                        </a:solidFill>
-                        <a:latin typeface="Arial Narrow" panose="020B0606020202030204" pitchFamily="34" charset="0"/>
-                        <a:cs typeface="Arial"/>
-                        <a:sym typeface="Arial"/>
-                      </a:endParaRPr>
                     </a:p>
                   </a:txBody>
                   <a:tcPr/>
@@ -8438,23 +6961,7 @@
                     <a:bodyPr/>
                     <a:lstStyle/>
                     <a:p>
-                      <a:pPr marL="0" marR="0" lvl="0" indent="0" algn="ctr" defTabSz="914400" rtl="0" eaLnBrk="1" fontAlgn="ctr" latinLnBrk="0" hangingPunct="1">
-                        <a:lnSpc>
-                          <a:spcPct val="100000"/>
-                        </a:lnSpc>
-                        <a:spcBef>
-                          <a:spcPts val="0"/>
-                        </a:spcBef>
-                        <a:spcAft>
-                          <a:spcPts val="0"/>
-                        </a:spcAft>
-                        <a:buClrTx/>
-                        <a:buSzTx/>
-                        <a:buFontTx/>
-                        <a:buNone/>
-                        <a:tabLst/>
-                        <a:defRPr/>
-                      </a:pPr>
+                      <a:pPr algn="ctr" rtl="0" fontAlgn="ctr"/>
                       <a:r>
                         <a:rPr lang="es-PE" sz="1000" b="0" i="0" u="none" strike="noStrike" dirty="0">
                           <a:solidFill>
@@ -8463,87 +6970,8 @@
                           <a:effectLst/>
                           <a:latin typeface="Arial Narrow" panose="020B0606020202030204" pitchFamily="34" charset="0"/>
                         </a:rPr>
-                        <a:t>2284093</a:t>
+                        <a:t>49568</a:t>
                       </a:r>
-                    </a:p>
-                  </a:txBody>
-                  <a:tcPr marL="6772" marR="6772" marT="6772" marB="0" anchor="ctr"/>
-                </a:tc>
-                <a:tc>
-                  <a:txBody>
-                    <a:bodyPr/>
-                    <a:lstStyle/>
-                    <a:p>
-                      <a:pPr algn="ctr" rtl="0" fontAlgn="ctr"/>
-                      <a:endParaRPr lang="es-PE" sz="1000" b="0" i="0" u="none" strike="noStrike" dirty="0">
-                        <a:solidFill>
-                          <a:srgbClr val="000000"/>
-                        </a:solidFill>
-                        <a:effectLst/>
-                        <a:latin typeface="Arial Narrow" panose="020B0606020202030204" pitchFamily="34" charset="0"/>
-                      </a:endParaRPr>
-                    </a:p>
-                  </a:txBody>
-                  <a:tcPr marL="6772" marR="6772" marT="6772" marB="0" anchor="ctr"/>
-                </a:tc>
-                <a:tc>
-                  <a:txBody>
-                    <a:bodyPr/>
-                    <a:lstStyle/>
-                    <a:p>
-                      <a:pPr marL="0" marR="0" lvl="0" indent="0" algn="l" defTabSz="914400" rtl="0" eaLnBrk="1" fontAlgn="ctr" latinLnBrk="0" hangingPunct="1">
-                        <a:lnSpc>
-                          <a:spcPct val="100000"/>
-                        </a:lnSpc>
-                        <a:spcBef>
-                          <a:spcPts val="0"/>
-                        </a:spcBef>
-                        <a:spcAft>
-                          <a:spcPts val="0"/>
-                        </a:spcAft>
-                        <a:buClrTx/>
-                        <a:buSzTx/>
-                        <a:buFontTx/>
-                        <a:buNone/>
-                        <a:tabLst/>
-                        <a:defRPr/>
-                      </a:pPr>
-                      <a:r>
-                        <a:rPr lang="es-PE" sz="1000" b="0" i="0" u="none" strike="noStrike" dirty="0" err="1">
-                          <a:solidFill>
-                            <a:srgbClr val="000000"/>
-                          </a:solidFill>
-                          <a:effectLst/>
-                          <a:highlight>
-                            <a:srgbClr val="FF0000"/>
-                          </a:highlight>
-                          <a:latin typeface="Arial Narrow" panose="020B0606020202030204" pitchFamily="34" charset="0"/>
-                        </a:rPr>
-                        <a:t>Educacion</a:t>
-                      </a:r>
-                      <a:endParaRPr lang="es-PE" sz="1000" b="0" i="0" u="none" strike="noStrike" dirty="0">
-                        <a:solidFill>
-                          <a:srgbClr val="000000"/>
-                        </a:solidFill>
-                        <a:effectLst/>
-                        <a:highlight>
-                          <a:srgbClr val="FF0000"/>
-                        </a:highlight>
-                        <a:latin typeface="Arial Narrow" panose="020B0606020202030204" pitchFamily="34" charset="0"/>
-                      </a:endParaRPr>
-                    </a:p>
-                    <a:p>
-                      <a:pPr algn="l" rtl="0" fontAlgn="ctr"/>
-                      <a:endParaRPr lang="es-PE" sz="1000" b="0" i="0" u="none" strike="noStrike" dirty="0">
-                        <a:solidFill>
-                          <a:srgbClr val="000000"/>
-                        </a:solidFill>
-                        <a:effectLst/>
-                        <a:highlight>
-                          <a:srgbClr val="FF0000"/>
-                        </a:highlight>
-                        <a:latin typeface="Arial Narrow" panose="020B0606020202030204" pitchFamily="34" charset="0"/>
-                      </a:endParaRPr>
                     </a:p>
                   </a:txBody>
                   <a:tcPr marL="6772" marR="6772" marT="6772" marB="0" anchor="ctr"/>
@@ -8573,21 +7001,19 @@
                         <a:defRPr/>
                       </a:pPr>
                       <a:r>
-                        <a:rPr lang="es-PE" sz="1000" b="0" u="none" strike="noStrike" cap="none" dirty="0">
+                        <a:rPr lang="es-PE" sz="800" b="0" u="none" strike="noStrike" cap="none" dirty="0">
                           <a:solidFill>
                             <a:srgbClr val="000000"/>
                           </a:solidFill>
-                          <a:latin typeface="Arial Narrow" panose="020B0606020202030204" pitchFamily="34" charset="0"/>
                           <a:sym typeface="Arial"/>
-                          <a:hlinkClick r:id="" action="ppaction://noaction"/>
                         </a:rPr>
-                        <a:t>MEJORAMIENTO DE LOS SERVICIOS EDUCATIVOS INICIALES DE 10 INSTITUCIONES EDUCATIVAS DEL, DISTRITO DE TALAVERA - ANDAHUAYLAS - APURIMAC</a:t>
+                        <a:t>CREACION DE LOS SERVICIOS DE CENTROS DE DESARROLLO INTEGRAL DE LA FAMILIA EN LAS 7 PROVINCIAS DEL DEPARTAMENTO DE APURIMAC</a:t>
                       </a:r>
-                      <a:endParaRPr lang="es-PE" sz="1000" b="0" i="0" u="none" strike="noStrike" cap="none" dirty="0">
+                      <a:endParaRPr lang="es-PE" sz="800" b="0" i="0" u="none" strike="noStrike" cap="none" dirty="0">
                         <a:solidFill>
                           <a:srgbClr val="000000"/>
                         </a:solidFill>
-                        <a:latin typeface="Arial Narrow" panose="020B0606020202030204" pitchFamily="34" charset="0"/>
+                        <a:latin typeface="Arial"/>
                         <a:cs typeface="Arial"/>
                         <a:sym typeface="Arial"/>
                       </a:endParaRPr>
@@ -8620,15 +7046,15 @@
                         <a:defRPr/>
                       </a:pPr>
                       <a:r>
-                        <a:rPr lang="es-PE" sz="1000" b="0" i="0" u="none" strike="noStrike" cap="none" dirty="0">
+                        <a:rPr lang="es-PE" sz="800" b="0" i="0" u="none" strike="noStrike" cap="none" dirty="0">
                           <a:solidFill>
                             <a:srgbClr val="000000"/>
                           </a:solidFill>
-                          <a:latin typeface="Arial Narrow" panose="020B0606020202030204" pitchFamily="34" charset="0"/>
+                          <a:latin typeface="+mn-lt"/>
                           <a:cs typeface="Arial"/>
                           <a:sym typeface="Arial"/>
                         </a:rPr>
-                        <a:t>15,656,328</a:t>
+                        <a:t> 11,142,069.55 </a:t>
                       </a:r>
                     </a:p>
                   </a:txBody>
@@ -8659,23 +7085,16 @@
                         <a:defRPr/>
                       </a:pPr>
                       <a:r>
-                        <a:rPr lang="es-PE" sz="1000" b="0" u="none" strike="noStrike" cap="none" dirty="0">
+                        <a:rPr lang="es-PE" sz="800" b="0" i="0" u="none" strike="noStrike" cap="none" dirty="0">
                           <a:solidFill>
                             <a:srgbClr val="000000"/>
                           </a:solidFill>
-                          <a:latin typeface="Arial Narrow" panose="020B0606020202030204" pitchFamily="34" charset="0"/>
+                          <a:latin typeface="Arial"/>
+                          <a:cs typeface="Arial"/>
                           <a:sym typeface="Arial"/>
                         </a:rPr>
-                        <a:t>(desactivado temporalmente)</a:t>
+                        <a:t>En formulación, Avance 70%</a:t>
                       </a:r>
-                      <a:endParaRPr lang="es-PE" sz="1000" b="0" i="0" u="none" strike="noStrike" cap="none" dirty="0">
-                        <a:solidFill>
-                          <a:srgbClr val="000000"/>
-                        </a:solidFill>
-                        <a:latin typeface="Arial Narrow" panose="020B0606020202030204" pitchFamily="34" charset="0"/>
-                        <a:cs typeface="Arial"/>
-                        <a:sym typeface="Arial"/>
-                      </a:endParaRPr>
                     </a:p>
                   </a:txBody>
                   <a:tcPr/>
@@ -8705,15 +7124,47 @@
                         <a:defRPr/>
                       </a:pPr>
                       <a:r>
-                        <a:rPr lang="es-PE" sz="1000" b="0" i="0" u="none" strike="noStrike" cap="none" dirty="0">
+                        <a:rPr lang="es-PE" sz="800" b="0" i="0" u="none" strike="noStrike" cap="none" dirty="0">
                           <a:solidFill>
                             <a:srgbClr val="000000"/>
                           </a:solidFill>
-                          <a:latin typeface="Arial Narrow" panose="020B0606020202030204" pitchFamily="34" charset="0"/>
+                          <a:latin typeface="Arial"/>
                           <a:cs typeface="Arial"/>
                           <a:sym typeface="Arial"/>
                         </a:rPr>
-                        <a:t>03 meses</a:t>
+                        <a:t>01-07-2020</a:t>
+                      </a:r>
+                    </a:p>
+                    <a:p>
+                      <a:pPr marL="0" marR="0" lvl="0" indent="0" algn="l" defTabSz="914400" rtl="0" eaLnBrk="1" fontAlgn="auto" latinLnBrk="0" hangingPunct="1">
+                        <a:lnSpc>
+                          <a:spcPct val="100000"/>
+                        </a:lnSpc>
+                        <a:spcBef>
+                          <a:spcPts val="0"/>
+                        </a:spcBef>
+                        <a:spcAft>
+                          <a:spcPts val="0"/>
+                        </a:spcAft>
+                        <a:buClr>
+                          <a:srgbClr val="000000"/>
+                        </a:buClr>
+                        <a:buSzTx/>
+                        <a:buFont typeface="Arial"/>
+                        <a:buNone/>
+                        <a:tabLst/>
+                        <a:defRPr/>
+                      </a:pPr>
+                      <a:r>
+                        <a:rPr lang="es-PE" sz="800" b="0" i="0" u="none" strike="noStrike" cap="none" dirty="0">
+                          <a:solidFill>
+                            <a:srgbClr val="000000"/>
+                          </a:solidFill>
+                          <a:latin typeface="Arial"/>
+                          <a:cs typeface="Arial"/>
+                          <a:sym typeface="Arial"/>
+                        </a:rPr>
+                        <a:t>14-Ago-2020</a:t>
                       </a:r>
                     </a:p>
                   </a:txBody>
@@ -8744,11 +7195,15 @@
                         <a:defRPr/>
                       </a:pPr>
                       <a:r>
-                        <a:rPr lang="es-PE" sz="1000" b="0" u="none" strike="noStrike" dirty="0">
-                          <a:effectLst/>
-                          <a:latin typeface="Arial Narrow" panose="020B0606020202030204" pitchFamily="34" charset="0"/>
+                        <a:rPr lang="es-PE" sz="800" b="0" i="0" u="none" strike="noStrike" cap="none" dirty="0">
+                          <a:solidFill>
+                            <a:srgbClr val="000000"/>
+                          </a:solidFill>
+                          <a:latin typeface="Arial"/>
+                          <a:cs typeface="Arial"/>
+                          <a:sym typeface="Arial"/>
                         </a:rPr>
-                        <a:t> 10 II.EE. Iniciales </a:t>
+                        <a:t>3 CEDIF</a:t>
                       </a:r>
                     </a:p>
                     <a:p>
@@ -8772,20 +7227,16 @@
                         <a:defRPr/>
                       </a:pPr>
                       <a:r>
-                        <a:rPr lang="es-PE" sz="1000" b="0" u="none" strike="noStrike" dirty="0">
-                          <a:effectLst/>
-                          <a:latin typeface="Arial Narrow" panose="020B0606020202030204" pitchFamily="34" charset="0"/>
+                        <a:rPr lang="es-PE" sz="800" b="0" i="0" u="none" strike="noStrike" cap="none" dirty="0">
+                          <a:solidFill>
+                            <a:srgbClr val="000000"/>
+                          </a:solidFill>
+                          <a:latin typeface="Arial"/>
+                          <a:cs typeface="Arial"/>
+                          <a:sym typeface="Arial"/>
                         </a:rPr>
-                        <a:t>126 alumnos  </a:t>
+                        <a:t>300 personas en situación de vulnerabilidad</a:t>
                       </a:r>
-                      <a:endParaRPr lang="es-PE" sz="1000" b="0" i="0" u="none" strike="noStrike" cap="none" dirty="0">
-                        <a:solidFill>
-                          <a:srgbClr val="000000"/>
-                        </a:solidFill>
-                        <a:latin typeface="Arial Narrow" panose="020B0606020202030204" pitchFamily="34" charset="0"/>
-                        <a:cs typeface="Arial"/>
-                        <a:sym typeface="Arial"/>
-                      </a:endParaRPr>
                     </a:p>
                   </a:txBody>
                   <a:tcPr/>
@@ -8796,74 +7247,15 @@
                     <a:lstStyle/>
                     <a:p>
                       <a:r>
-                        <a:rPr lang="es-PE" sz="1000" b="0" i="0" u="none" strike="noStrike" cap="none" dirty="0" err="1">
+                        <a:rPr lang="es-PE" sz="800" b="0" i="0" u="none" strike="noStrike" cap="none" dirty="0">
                           <a:solidFill>
                             <a:srgbClr val="000000"/>
                           </a:solidFill>
-                          <a:latin typeface="Arial Narrow" panose="020B0606020202030204" pitchFamily="34" charset="0"/>
+                          <a:latin typeface="+mn-lt"/>
                           <a:cs typeface="Arial"/>
                           <a:sym typeface="Arial"/>
                         </a:rPr>
-                        <a:t>Adm</a:t>
-                      </a:r>
-                      <a:r>
-                        <a:rPr lang="es-PE" sz="1000" b="0" i="0" u="none" strike="noStrike" cap="none" dirty="0">
-                          <a:solidFill>
-                            <a:srgbClr val="000000"/>
-                          </a:solidFill>
-                          <a:latin typeface="Arial Narrow" panose="020B0606020202030204" pitchFamily="34" charset="0"/>
-                          <a:cs typeface="Arial"/>
-                          <a:sym typeface="Arial"/>
-                        </a:rPr>
-                        <a:t>. Directa</a:t>
-                      </a:r>
-                    </a:p>
-                    <a:p>
-                      <a:r>
-                        <a:rPr lang="es-PE" sz="1000" b="0" i="0" u="none" strike="noStrike" cap="none" dirty="0">
-                          <a:solidFill>
-                            <a:srgbClr val="000000"/>
-                          </a:solidFill>
-                          <a:latin typeface="Arial Narrow" panose="020B0606020202030204" pitchFamily="34" charset="0"/>
-                          <a:cs typeface="Arial"/>
-                          <a:sym typeface="Arial"/>
-                        </a:rPr>
-                        <a:t>Pi declarado viable el 2015, (UF Municipalidad Distrital de </a:t>
-                      </a:r>
-                      <a:r>
-                        <a:rPr lang="es-PE" sz="1000" b="0" i="0" u="none" strike="noStrike" cap="none" dirty="0" err="1">
-                          <a:solidFill>
-                            <a:srgbClr val="000000"/>
-                          </a:solidFill>
-                          <a:latin typeface="Arial Narrow" panose="020B0606020202030204" pitchFamily="34" charset="0"/>
-                          <a:cs typeface="Arial"/>
-                          <a:sym typeface="Arial"/>
-                        </a:rPr>
-                        <a:t>Chicmo</a:t>
-                      </a:r>
-                      <a:r>
-                        <a:rPr lang="es-PE" sz="1000" b="0" i="0" u="none" strike="noStrike" cap="none" dirty="0">
-                          <a:solidFill>
-                            <a:srgbClr val="000000"/>
-                          </a:solidFill>
-                          <a:latin typeface="Arial Narrow" panose="020B0606020202030204" pitchFamily="34" charset="0"/>
-                          <a:cs typeface="Arial"/>
-                          <a:sym typeface="Arial"/>
-                        </a:rPr>
-                        <a:t>) desactivado por periodo de vigencia. Se requiere la actualización del Estudio.</a:t>
-                      </a:r>
-                    </a:p>
-                    <a:p>
-                      <a:r>
-                        <a:rPr lang="es-PE" sz="1000" b="0" i="0" u="none" strike="noStrike" cap="none" dirty="0">
-                          <a:solidFill>
-                            <a:srgbClr val="000000"/>
-                          </a:solidFill>
-                          <a:latin typeface="Arial Narrow" panose="020B0606020202030204" pitchFamily="34" charset="0"/>
-                          <a:cs typeface="Arial"/>
-                          <a:sym typeface="Arial"/>
-                        </a:rPr>
-                        <a:t>Se requiere analizar la intervención en IEI con poca cantidad de alumnos</a:t>
+                        <a:t>Administración Directa</a:t>
                       </a:r>
                     </a:p>
                   </a:txBody>
@@ -8897,20 +7289,59 @@
                         <a:buFont typeface="Arial"/>
                       </a:pPr>
                       <a:r>
-                        <a:rPr lang="es-PE" sz="1000" b="0" u="none" strike="noStrike" cap="none" dirty="0">
+                        <a:rPr lang="es-PE" sz="1000" b="0" i="0" u="none" strike="noStrike" cap="none" dirty="0">
                           <a:solidFill>
                             <a:srgbClr val="000000"/>
                           </a:solidFill>
                           <a:latin typeface="Arial Narrow" panose="020B0606020202030204" pitchFamily="34" charset="0"/>
+                          <a:cs typeface="Arial"/>
                           <a:sym typeface="Arial"/>
                         </a:rPr>
                         <a:t>3</a:t>
                       </a:r>
-                      <a:endParaRPr lang="es-PE" sz="1000" b="0" i="0" u="none" strike="noStrike" cap="none" dirty="0">
+                    </a:p>
+                  </a:txBody>
+                  <a:tcPr/>
+                </a:tc>
+                <a:tc>
+                  <a:txBody>
+                    <a:bodyPr/>
+                    <a:lstStyle/>
+                    <a:p>
+                      <a:pPr algn="ctr" rtl="0" fontAlgn="ctr"/>
+                      <a:r>
+                        <a:rPr lang="es-PE" sz="1000" b="0" i="0" u="none" strike="noStrike" dirty="0">
+                          <a:solidFill>
+                            <a:srgbClr val="000000"/>
+                          </a:solidFill>
+                          <a:effectLst/>
+                          <a:latin typeface="Arial Narrow" panose="020B0606020202030204" pitchFamily="34" charset="0"/>
+                        </a:rPr>
+                        <a:t>49570	</a:t>
+                      </a:r>
+                    </a:p>
+                  </a:txBody>
+                  <a:tcPr marL="6772" marR="6772" marT="6772" marB="0" anchor="ctr"/>
+                </a:tc>
+                <a:tc>
+                  <a:txBody>
+                    <a:bodyPr/>
+                    <a:lstStyle/>
+                    <a:p>
+                      <a:r>
+                        <a:rPr lang="es-PE" sz="800" b="0" u="none" strike="noStrike" cap="none" dirty="0">
+                          <a:solidFill>
+                            <a:srgbClr val="000000"/>
+                          </a:solidFill>
+                          <a:sym typeface="Arial"/>
+                        </a:rPr>
+                        <a:t>CREACION DE LOS SERVICIOS DE RESIDENCIA Y ATENCIÓN A ADULTOS MAYORES EN LAS 6 PROVINCIAS DEL DEPARTAMENTO DE APURIMAC</a:t>
+                      </a:r>
+                      <a:endParaRPr lang="es-PE" sz="800" b="0" i="0" u="none" strike="noStrike" cap="none" dirty="0">
                         <a:solidFill>
                           <a:srgbClr val="000000"/>
                         </a:solidFill>
-                        <a:latin typeface="Arial Narrow" panose="020B0606020202030204" pitchFamily="34" charset="0"/>
+                        <a:latin typeface="Arial"/>
                         <a:cs typeface="Arial"/>
                         <a:sym typeface="Arial"/>
                       </a:endParaRPr>
@@ -8923,7 +7354,115 @@
                     <a:bodyPr/>
                     <a:lstStyle/>
                     <a:p>
-                      <a:pPr marL="0" marR="0" lvl="0" indent="0" algn="ctr" defTabSz="914400" rtl="0" eaLnBrk="1" fontAlgn="ctr" latinLnBrk="0" hangingPunct="1">
+                      <a:r>
+                        <a:rPr lang="es-PE" sz="800" b="0" i="0" u="none" strike="noStrike" cap="none" dirty="0">
+                          <a:solidFill>
+                            <a:srgbClr val="000000"/>
+                          </a:solidFill>
+                          <a:latin typeface="+mn-lt"/>
+                          <a:cs typeface="Arial"/>
+                          <a:sym typeface="Arial"/>
+                        </a:rPr>
+                        <a:t>34,129,120.09	</a:t>
+                      </a:r>
+                    </a:p>
+                  </a:txBody>
+                  <a:tcPr/>
+                </a:tc>
+                <a:tc>
+                  <a:txBody>
+                    <a:bodyPr/>
+                    <a:lstStyle/>
+                    <a:p>
+                      <a:pPr marL="0" marR="0" lvl="0" indent="0" algn="l" defTabSz="914400" rtl="0" eaLnBrk="1" fontAlgn="auto" latinLnBrk="0" hangingPunct="1">
+                        <a:lnSpc>
+                          <a:spcPct val="100000"/>
+                        </a:lnSpc>
+                        <a:spcBef>
+                          <a:spcPts val="0"/>
+                        </a:spcBef>
+                        <a:spcAft>
+                          <a:spcPts val="0"/>
+                        </a:spcAft>
+                        <a:buClr>
+                          <a:srgbClr val="000000"/>
+                        </a:buClr>
+                        <a:buSzTx/>
+                        <a:buFont typeface="Arial"/>
+                        <a:buNone/>
+                        <a:tabLst/>
+                        <a:defRPr/>
+                      </a:pPr>
+                      <a:r>
+                        <a:rPr lang="es-PE" sz="800" b="0" dirty="0"/>
+                        <a:t>Idea</a:t>
+                      </a:r>
+                    </a:p>
+                  </a:txBody>
+                  <a:tcPr/>
+                </a:tc>
+                <a:tc>
+                  <a:txBody>
+                    <a:bodyPr/>
+                    <a:lstStyle/>
+                    <a:p>
+                      <a:pPr marL="0" marR="0" lvl="0" indent="0" algn="l" defTabSz="914400" rtl="0" eaLnBrk="1" fontAlgn="auto" latinLnBrk="0" hangingPunct="1">
+                        <a:lnSpc>
+                          <a:spcPct val="100000"/>
+                        </a:lnSpc>
+                        <a:spcBef>
+                          <a:spcPts val="0"/>
+                        </a:spcBef>
+                        <a:spcAft>
+                          <a:spcPts val="0"/>
+                        </a:spcAft>
+                        <a:buClr>
+                          <a:srgbClr val="000000"/>
+                        </a:buClr>
+                        <a:buSzTx/>
+                        <a:buFont typeface="Arial"/>
+                        <a:buNone/>
+                        <a:tabLst/>
+                        <a:defRPr/>
+                      </a:pPr>
+                      <a:r>
+                        <a:rPr lang="es-PE" sz="800" b="0" dirty="0"/>
+                        <a:t>4 meses</a:t>
+                      </a:r>
+                    </a:p>
+                  </a:txBody>
+                  <a:tcPr/>
+                </a:tc>
+                <a:tc>
+                  <a:txBody>
+                    <a:bodyPr/>
+                    <a:lstStyle/>
+                    <a:p>
+                      <a:pPr marL="171450" indent="-171450">
+                        <a:buFont typeface="Arial" panose="020B0604020202020204" pitchFamily="34" charset="0"/>
+                        <a:buChar char="•"/>
+                      </a:pPr>
+                      <a:r>
+                        <a:rPr lang="es-PE" sz="800" b="0" i="0" u="none" strike="noStrike" cap="none" dirty="0">
+                          <a:solidFill>
+                            <a:srgbClr val="000000"/>
+                          </a:solidFill>
+                          <a:latin typeface="Arial"/>
+                          <a:cs typeface="Arial"/>
+                          <a:sym typeface="Arial"/>
+                        </a:rPr>
+                        <a:t>06 CAAM </a:t>
+                      </a:r>
+                    </a:p>
+                  </a:txBody>
+                  <a:tcPr/>
+                </a:tc>
+                <a:tc>
+                  <a:txBody>
+                    <a:bodyPr/>
+                    <a:lstStyle/>
+                    <a:p>
+                      <a:pPr marL="0" marR="0" lvl="0" indent="0" algn="l" defTabSz="914400" rtl="0" eaLnBrk="1" fontAlgn="auto" latinLnBrk="0" hangingPunct="1">
                         <a:lnSpc>
                           <a:spcPct val="100000"/>
                         </a:lnSpc>
@@ -8941,283 +7480,38 @@
                         <a:defRPr/>
                       </a:pPr>
                       <a:r>
-                        <a:rPr lang="es-PE" sz="1000" b="0" i="0" u="none" strike="noStrike" dirty="0">
+                        <a:rPr kumimoji="0" lang="es-PE" sz="800" b="0" i="0" u="none" strike="noStrike" kern="1200" cap="none" spc="0" normalizeH="0" baseline="0" noProof="0">
+                          <a:ln>
+                            <a:noFill/>
+                          </a:ln>
                           <a:solidFill>
                             <a:srgbClr val="000000"/>
                           </a:solidFill>
                           <a:effectLst/>
-                          <a:latin typeface="Arial Narrow" panose="020B0606020202030204" pitchFamily="34" charset="0"/>
+                          <a:uLnTx/>
+                          <a:uFillTx/>
+                          <a:latin typeface="Calibri" panose="020F0502020204030204"/>
+                          <a:ea typeface="+mn-ea"/>
+                          <a:cs typeface="Arial"/>
+                          <a:sym typeface="Arial"/>
                         </a:rPr>
-                        <a:t>----</a:t>
+                        <a:t>Por definir</a:t>
                       </a:r>
-                    </a:p>
-                    <a:p>
-                      <a:pPr algn="ctr" rtl="0" fontAlgn="ctr"/>
-                      <a:endParaRPr lang="es-PE" sz="1000" b="0" i="0" u="none" strike="noStrike" dirty="0">
+                      <a:endParaRPr kumimoji="0" lang="es-PE" sz="800" b="0" i="0" u="none" strike="noStrike" kern="1200" cap="none" spc="0" normalizeH="0" baseline="0" noProof="0" dirty="0">
+                        <a:ln>
+                          <a:noFill/>
+                        </a:ln>
                         <a:solidFill>
                           <a:srgbClr val="000000"/>
                         </a:solidFill>
                         <a:effectLst/>
-                        <a:latin typeface="Arial Narrow" panose="020B0606020202030204" pitchFamily="34" charset="0"/>
-                      </a:endParaRPr>
-                    </a:p>
-                  </a:txBody>
-                  <a:tcPr marL="6772" marR="6772" marT="6772" marB="0" anchor="ctr"/>
-                </a:tc>
-                <a:tc>
-                  <a:txBody>
-                    <a:bodyPr/>
-                    <a:lstStyle/>
-                    <a:p>
-                      <a:pPr algn="ctr" rtl="0" fontAlgn="ctr"/>
-                      <a:r>
-                        <a:rPr lang="es-PE" sz="1000" b="0" i="0" u="none" strike="noStrike" dirty="0">
-                          <a:solidFill>
-                            <a:srgbClr val="000000"/>
-                          </a:solidFill>
-                          <a:effectLst/>
-                          <a:latin typeface="Arial Narrow" panose="020B0606020202030204" pitchFamily="34" charset="0"/>
-                        </a:rPr>
-                        <a:t>108724</a:t>
-                      </a:r>
-                    </a:p>
-                  </a:txBody>
-                  <a:tcPr marL="6772" marR="6772" marT="6772" marB="0" anchor="ctr"/>
-                </a:tc>
-                <a:tc>
-                  <a:txBody>
-                    <a:bodyPr/>
-                    <a:lstStyle/>
-                    <a:p>
-                      <a:pPr marL="0" marR="0" lvl="0" indent="0" algn="l" defTabSz="914400" rtl="0" eaLnBrk="1" fontAlgn="ctr" latinLnBrk="0" hangingPunct="1">
-                        <a:lnSpc>
-                          <a:spcPct val="100000"/>
-                        </a:lnSpc>
-                        <a:spcBef>
-                          <a:spcPts val="0"/>
-                        </a:spcBef>
-                        <a:spcAft>
-                          <a:spcPts val="0"/>
-                        </a:spcAft>
-                        <a:buClrTx/>
-                        <a:buSzTx/>
-                        <a:buFontTx/>
-                        <a:buNone/>
-                        <a:tabLst/>
-                        <a:defRPr/>
-                      </a:pPr>
-                      <a:r>
-                        <a:rPr lang="es-PE" sz="1000" b="0" i="0" u="none" strike="noStrike" dirty="0" err="1">
-                          <a:solidFill>
-                            <a:srgbClr val="000000"/>
-                          </a:solidFill>
-                          <a:effectLst/>
-                          <a:highlight>
-                            <a:srgbClr val="FF0000"/>
-                          </a:highlight>
-                          <a:latin typeface="Arial Narrow" panose="020B0606020202030204" pitchFamily="34" charset="0"/>
-                        </a:rPr>
-                        <a:t>Educacion</a:t>
-                      </a:r>
-                      <a:endParaRPr lang="es-PE" sz="1000" b="0" i="0" u="none" strike="noStrike" dirty="0">
-                        <a:solidFill>
-                          <a:srgbClr val="000000"/>
-                        </a:solidFill>
-                        <a:effectLst/>
-                        <a:highlight>
-                          <a:srgbClr val="FF0000"/>
-                        </a:highlight>
-                        <a:latin typeface="Arial Narrow" panose="020B0606020202030204" pitchFamily="34" charset="0"/>
-                      </a:endParaRPr>
-                    </a:p>
-                    <a:p>
-                      <a:pPr algn="l" rtl="0" fontAlgn="ctr"/>
-                      <a:endParaRPr lang="es-PE" sz="1000" b="0" i="0" u="none" strike="noStrike" dirty="0">
-                        <a:solidFill>
-                          <a:srgbClr val="000000"/>
-                        </a:solidFill>
-                        <a:effectLst/>
-                        <a:highlight>
-                          <a:srgbClr val="FF0000"/>
-                        </a:highlight>
-                        <a:latin typeface="Arial Narrow" panose="020B0606020202030204" pitchFamily="34" charset="0"/>
-                      </a:endParaRPr>
-                    </a:p>
-                  </a:txBody>
-                  <a:tcPr marL="6772" marR="6772" marT="6772" marB="0" anchor="ctr"/>
-                </a:tc>
-                <a:tc>
-                  <a:txBody>
-                    <a:bodyPr/>
-                    <a:lstStyle/>
-                    <a:p>
-                      <a:r>
-                        <a:rPr lang="es-PE" sz="1000" b="0" u="none" strike="noStrike" cap="none" dirty="0">
-                          <a:solidFill>
-                            <a:srgbClr val="000000"/>
-                          </a:solidFill>
-                          <a:latin typeface="Arial Narrow" panose="020B0606020202030204" pitchFamily="34" charset="0"/>
-                          <a:sym typeface="Arial"/>
-                          <a:hlinkClick r:id="" action="ppaction://noaction"/>
-                        </a:rPr>
-                        <a:t>MEJORAMIENTO DEL INSTITUTO DE EDUCACIÓN SUPERIOR TECNOLÓGICO ALFREDO SARMIENTO PALOMINO, DISTRITO DE HUANCARAMA - PROVINCIA DE ANDAHUAYLAS - DEPARTAMENTO DE APURIMAC</a:t>
-                      </a:r>
-                      <a:endParaRPr lang="es-PE" sz="1000" b="0" i="0" u="none" strike="noStrike" cap="none" dirty="0">
-                        <a:solidFill>
-                          <a:srgbClr val="000000"/>
-                        </a:solidFill>
-                        <a:latin typeface="Arial Narrow" panose="020B0606020202030204" pitchFamily="34" charset="0"/>
+                        <a:uLnTx/>
+                        <a:uFillTx/>
+                        <a:latin typeface="Calibri" panose="020F0502020204030204"/>
+                        <a:ea typeface="+mn-ea"/>
                         <a:cs typeface="Arial"/>
                         <a:sym typeface="Arial"/>
                       </a:endParaRPr>
-                    </a:p>
-                  </a:txBody>
-                  <a:tcPr/>
-                </a:tc>
-                <a:tc>
-                  <a:txBody>
-                    <a:bodyPr/>
-                    <a:lstStyle/>
-                    <a:p>
-                      <a:r>
-                        <a:rPr lang="es-PE" sz="1000" b="0" i="0" u="none" strike="noStrike" cap="none" dirty="0">
-                          <a:solidFill>
-                            <a:srgbClr val="000000"/>
-                          </a:solidFill>
-                          <a:latin typeface="Arial Narrow" panose="020B0606020202030204" pitchFamily="34" charset="0"/>
-                          <a:cs typeface="Arial"/>
-                          <a:sym typeface="Arial"/>
-                        </a:rPr>
-                        <a:t> 11,595,000.00 	</a:t>
-                      </a:r>
-                    </a:p>
-                  </a:txBody>
-                  <a:tcPr/>
-                </a:tc>
-                <a:tc>
-                  <a:txBody>
-                    <a:bodyPr/>
-                    <a:lstStyle/>
-                    <a:p>
-                      <a:r>
-                        <a:rPr lang="es-PE" sz="1000" b="0" u="none" strike="noStrike" cap="none" dirty="0">
-                          <a:solidFill>
-                            <a:srgbClr val="000000"/>
-                          </a:solidFill>
-                          <a:latin typeface="Arial Narrow" panose="020B0606020202030204" pitchFamily="34" charset="0"/>
-                          <a:sym typeface="Arial"/>
-                        </a:rPr>
-                        <a:t>En Formulación</a:t>
-                      </a:r>
-                      <a:endParaRPr lang="es-PE" sz="1000" b="0" i="0" u="none" strike="noStrike" cap="none" dirty="0">
-                        <a:solidFill>
-                          <a:srgbClr val="000000"/>
-                        </a:solidFill>
-                        <a:latin typeface="Arial Narrow" panose="020B0606020202030204" pitchFamily="34" charset="0"/>
-                        <a:cs typeface="Arial"/>
-                        <a:sym typeface="Arial"/>
-                      </a:endParaRPr>
-                    </a:p>
-                  </a:txBody>
-                  <a:tcPr/>
-                </a:tc>
-                <a:tc>
-                  <a:txBody>
-                    <a:bodyPr/>
-                    <a:lstStyle/>
-                    <a:p>
-                      <a:r>
-                        <a:rPr lang="es-PE" sz="1000" b="0" u="none" strike="noStrike" cap="none" dirty="0">
-                          <a:solidFill>
-                            <a:srgbClr val="000000"/>
-                          </a:solidFill>
-                          <a:latin typeface="Arial Narrow" panose="020B0606020202030204" pitchFamily="34" charset="0"/>
-                          <a:sym typeface="Arial"/>
-                        </a:rPr>
-                        <a:t>18/06/2020</a:t>
-                      </a:r>
-                    </a:p>
-                    <a:p>
-                      <a:r>
-                        <a:rPr lang="es-PE" sz="1000" b="0" u="none" strike="noStrike" cap="none" dirty="0">
-                          <a:solidFill>
-                            <a:srgbClr val="000000"/>
-                          </a:solidFill>
-                          <a:latin typeface="Arial Narrow" panose="020B0606020202030204" pitchFamily="34" charset="0"/>
-                          <a:sym typeface="Arial"/>
-                        </a:rPr>
-                        <a:t>31/08/2020</a:t>
-                      </a:r>
-                      <a:endParaRPr lang="es-PE" sz="1000" b="0" i="0" u="none" strike="noStrike" cap="none" dirty="0">
-                        <a:solidFill>
-                          <a:srgbClr val="000000"/>
-                        </a:solidFill>
-                        <a:latin typeface="Arial Narrow" panose="020B0606020202030204" pitchFamily="34" charset="0"/>
-                        <a:cs typeface="Arial"/>
-                        <a:sym typeface="Arial"/>
-                      </a:endParaRPr>
-                    </a:p>
-                  </a:txBody>
-                  <a:tcPr/>
-                </a:tc>
-                <a:tc>
-                  <a:txBody>
-                    <a:bodyPr/>
-                    <a:lstStyle/>
-                    <a:p>
-                      <a:pPr marL="171450" indent="-171450">
-                        <a:buFont typeface="Arial" panose="020B0604020202020204" pitchFamily="34" charset="0"/>
-                        <a:buChar char="•"/>
-                      </a:pPr>
-                      <a:r>
-                        <a:rPr lang="es-PE" sz="1000" b="0" u="none" strike="noStrike" cap="none" dirty="0">
-                          <a:solidFill>
-                            <a:srgbClr val="000000"/>
-                          </a:solidFill>
-                          <a:latin typeface="Arial Narrow" panose="020B0606020202030204" pitchFamily="34" charset="0"/>
-                          <a:sym typeface="Arial"/>
-                        </a:rPr>
-                        <a:t>(Avance 40%)</a:t>
-                      </a:r>
-                      <a:endParaRPr lang="es-PE" sz="1000" b="0" i="0" u="none" strike="noStrike" cap="none" dirty="0">
-                        <a:solidFill>
-                          <a:srgbClr val="000000"/>
-                        </a:solidFill>
-                        <a:latin typeface="Arial Narrow" panose="020B0606020202030204" pitchFamily="34" charset="0"/>
-                        <a:cs typeface="Arial"/>
-                        <a:sym typeface="Arial"/>
-                      </a:endParaRPr>
-                    </a:p>
-                  </a:txBody>
-                  <a:tcPr/>
-                </a:tc>
-                <a:tc>
-                  <a:txBody>
-                    <a:bodyPr/>
-                    <a:lstStyle/>
-                    <a:p>
-                      <a:r>
-                        <a:rPr lang="es-PE" sz="1000" b="0" i="0" u="none" strike="noStrike" cap="none" dirty="0" err="1">
-                          <a:solidFill>
-                            <a:srgbClr val="000000"/>
-                          </a:solidFill>
-                          <a:latin typeface="Arial Narrow" panose="020B0606020202030204" pitchFamily="34" charset="0"/>
-                          <a:cs typeface="Arial"/>
-                          <a:sym typeface="Arial"/>
-                        </a:rPr>
-                        <a:t>Adm</a:t>
-                      </a:r>
-                      <a:r>
-                        <a:rPr lang="es-PE" sz="1000" b="0" i="0" u="none" strike="noStrike" cap="none" dirty="0">
-                          <a:solidFill>
-                            <a:srgbClr val="000000"/>
-                          </a:solidFill>
-                          <a:latin typeface="Arial Narrow" panose="020B0606020202030204" pitchFamily="34" charset="0"/>
-                          <a:cs typeface="Arial"/>
-                          <a:sym typeface="Arial"/>
-                        </a:rPr>
-                        <a:t>. Directa</a:t>
-                      </a:r>
                     </a:p>
                   </a:txBody>
                   <a:tcPr/>
@@ -9250,72 +7544,19 @@
                         <a:buFont typeface="Arial"/>
                       </a:pPr>
                       <a:r>
-                        <a:rPr lang="es-PE" sz="1000" b="0" u="none" strike="noStrike" cap="none" dirty="0">
+                        <a:rPr lang="es-PE" sz="1000" b="0" i="0" u="none" strike="noStrike" cap="none" dirty="0">
                           <a:solidFill>
                             <a:srgbClr val="000000"/>
                           </a:solidFill>
                           <a:latin typeface="Arial Narrow" panose="020B0606020202030204" pitchFamily="34" charset="0"/>
+                          <a:cs typeface="Arial"/>
                           <a:sym typeface="Arial"/>
                         </a:rPr>
                         <a:t>4</a:t>
                       </a:r>
-                      <a:endParaRPr lang="es-PE" sz="1000" b="0" i="0" u="none" strike="noStrike" cap="none" dirty="0">
-                        <a:solidFill>
-                          <a:srgbClr val="000000"/>
-                        </a:solidFill>
-                        <a:latin typeface="Arial Narrow" panose="020B0606020202030204" pitchFamily="34" charset="0"/>
-                        <a:cs typeface="Arial"/>
-                        <a:sym typeface="Arial"/>
-                      </a:endParaRPr>
                     </a:p>
                   </a:txBody>
                   <a:tcPr/>
-                </a:tc>
-                <a:tc>
-                  <a:txBody>
-                    <a:bodyPr/>
-                    <a:lstStyle/>
-                    <a:p>
-                      <a:pPr marL="0" marR="0" lvl="0" indent="0" algn="ctr" defTabSz="914400" rtl="0" eaLnBrk="1" fontAlgn="ctr" latinLnBrk="0" hangingPunct="1">
-                        <a:lnSpc>
-                          <a:spcPct val="100000"/>
-                        </a:lnSpc>
-                        <a:spcBef>
-                          <a:spcPts val="0"/>
-                        </a:spcBef>
-                        <a:spcAft>
-                          <a:spcPts val="0"/>
-                        </a:spcAft>
-                        <a:buClrTx/>
-                        <a:buSzTx/>
-                        <a:buFontTx/>
-                        <a:buNone/>
-                        <a:tabLst/>
-                        <a:defRPr/>
-                      </a:pPr>
-                      <a:r>
-                        <a:rPr lang="es-PE" sz="1000" b="0" i="0" u="none" strike="noStrike" dirty="0">
-                          <a:solidFill>
-                            <a:srgbClr val="000000"/>
-                          </a:solidFill>
-                          <a:effectLst/>
-                          <a:latin typeface="Arial Narrow" panose="020B0606020202030204" pitchFamily="34" charset="0"/>
-                        </a:rPr>
-                        <a:t>----</a:t>
-                      </a:r>
-                    </a:p>
-                    <a:p>
-                      <a:pPr algn="ctr" rtl="0" fontAlgn="ctr"/>
-                      <a:endParaRPr lang="es-PE" sz="1000" b="0" i="0" u="none" strike="noStrike" dirty="0">
-                        <a:solidFill>
-                          <a:srgbClr val="000000"/>
-                        </a:solidFill>
-                        <a:effectLst/>
-                        <a:latin typeface="Arial Narrow" panose="020B0606020202030204" pitchFamily="34" charset="0"/>
-                      </a:endParaRPr>
-                    </a:p>
-                  </a:txBody>
-                  <a:tcPr marL="6772" marR="6772" marT="6772" marB="0" anchor="ctr"/>
                 </a:tc>
                 <a:tc>
                   <a:txBody>
@@ -9331,7 +7572,7 @@
                           <a:effectLst/>
                           <a:latin typeface="Arial Narrow" panose="020B0606020202030204" pitchFamily="34" charset="0"/>
                         </a:rPr>
-                        <a:t>108789</a:t>
+                        <a:t>49577</a:t>
                       </a:r>
                     </a:p>
                   </a:txBody>
@@ -9342,84 +7583,20 @@
                     <a:bodyPr/>
                     <a:lstStyle/>
                     <a:p>
-                      <a:pPr marL="0" marR="0" lvl="0" indent="0" algn="l" defTabSz="914400" rtl="0" eaLnBrk="1" fontAlgn="ctr" latinLnBrk="0" hangingPunct="1">
-                        <a:lnSpc>
-                          <a:spcPct val="100000"/>
-                        </a:lnSpc>
-                        <a:spcBef>
-                          <a:spcPts val="0"/>
-                        </a:spcBef>
-                        <a:spcAft>
-                          <a:spcPts val="0"/>
-                        </a:spcAft>
-                        <a:buClrTx/>
-                        <a:buSzTx/>
-                        <a:buFontTx/>
-                        <a:buNone/>
-                        <a:tabLst/>
-                        <a:defRPr/>
-                      </a:pPr>
                       <a:r>
-                        <a:rPr lang="es-PE" sz="1000" b="0" i="0" u="none" strike="noStrike" dirty="0" err="1">
+                        <a:rPr lang="es-PE" sz="800" b="0" u="none" strike="noStrike" cap="none" dirty="0">
                           <a:solidFill>
                             <a:srgbClr val="000000"/>
                           </a:solidFill>
-                          <a:effectLst/>
-                          <a:highlight>
-                            <a:srgbClr val="FF0000"/>
-                          </a:highlight>
-                          <a:latin typeface="Arial Narrow" panose="020B0606020202030204" pitchFamily="34" charset="0"/>
+                          <a:sym typeface="Arial"/>
                         </a:rPr>
-                        <a:t>Educacion</a:t>
+                        <a:t>CREACION DE LOS SERVICIOS DE PROTECCIÓN A VICTIMAS DE VIOLENCIA CONTRA LA MUJER E INTEGRANTES DEL GRUPO FAMILIAR EN 5 PROVINCIAS DEL DEPARTAMENTO DE APURIMAC</a:t>
                       </a:r>
-                      <a:endParaRPr lang="es-PE" sz="1000" b="0" i="0" u="none" strike="noStrike" dirty="0">
+                      <a:endParaRPr lang="es-PE" sz="800" b="0" i="0" u="none" strike="noStrike" cap="none" dirty="0">
                         <a:solidFill>
                           <a:srgbClr val="000000"/>
                         </a:solidFill>
-                        <a:effectLst/>
-                        <a:highlight>
-                          <a:srgbClr val="FF0000"/>
-                        </a:highlight>
-                        <a:latin typeface="Arial Narrow" panose="020B0606020202030204" pitchFamily="34" charset="0"/>
-                      </a:endParaRPr>
-                    </a:p>
-                    <a:p>
-                      <a:pPr algn="l" rtl="0" fontAlgn="ctr"/>
-                      <a:endParaRPr lang="es-PE" sz="1000" b="0" i="0" u="none" strike="noStrike" dirty="0">
-                        <a:solidFill>
-                          <a:srgbClr val="000000"/>
-                        </a:solidFill>
-                        <a:effectLst/>
-                        <a:highlight>
-                          <a:srgbClr val="FF0000"/>
-                        </a:highlight>
-                        <a:latin typeface="Arial Narrow" panose="020B0606020202030204" pitchFamily="34" charset="0"/>
-                      </a:endParaRPr>
-                    </a:p>
-                  </a:txBody>
-                  <a:tcPr marL="6772" marR="6772" marT="6772" marB="0" anchor="ctr"/>
-                </a:tc>
-                <a:tc>
-                  <a:txBody>
-                    <a:bodyPr/>
-                    <a:lstStyle/>
-                    <a:p>
-                      <a:r>
-                        <a:rPr lang="es-PE" sz="1000" b="0" u="none" strike="noStrike" cap="none" dirty="0">
-                          <a:solidFill>
-                            <a:srgbClr val="000000"/>
-                          </a:solidFill>
-                          <a:latin typeface="Arial Narrow" panose="020B0606020202030204" pitchFamily="34" charset="0"/>
-                          <a:sym typeface="Arial"/>
-                          <a:hlinkClick r:id="" action="ppaction://noaction"/>
-                        </a:rPr>
-                        <a:t>MEJORAMIENTO DEL SERVICIO EDUCATIVO DEL NIVEL INICIAL N°1135 SANGABRIEL, N°171 PICHIUPATA, N° 39 HUANCARAMA, N° 938 HUACCAYHURA, DISTRITO DE HUANCARAMA PROVINCIA DE ANDAHUAYLAS, REGION APURIMAC</a:t>
-                      </a:r>
-                      <a:endParaRPr lang="es-PE" sz="1000" b="0" i="0" u="none" strike="noStrike" cap="none" dirty="0">
-                        <a:solidFill>
-                          <a:srgbClr val="000000"/>
-                        </a:solidFill>
-                        <a:latin typeface="Arial Narrow" panose="020B0606020202030204" pitchFamily="34" charset="0"/>
+                        <a:latin typeface="Arial"/>
                         <a:cs typeface="Arial"/>
                         <a:sym typeface="Arial"/>
                       </a:endParaRPr>
@@ -9433,15 +7610,15 @@
                     <a:lstStyle/>
                     <a:p>
                       <a:r>
-                        <a:rPr lang="es-PE" sz="1000" b="0" i="0" u="none" strike="noStrike" cap="none" dirty="0">
+                        <a:rPr lang="es-PE" sz="800" b="0" i="0" u="none" strike="noStrike" cap="none" dirty="0">
                           <a:solidFill>
                             <a:srgbClr val="000000"/>
                           </a:solidFill>
-                          <a:latin typeface="Arial Narrow" panose="020B0606020202030204" pitchFamily="34" charset="0"/>
+                          <a:latin typeface="+mn-lt"/>
                           <a:cs typeface="Arial"/>
                           <a:sym typeface="Arial"/>
                         </a:rPr>
-                        <a:t> 9,320,000.00 	</a:t>
+                        <a:t> 14,044,043.05 	</a:t>
                       </a:r>
                     </a:p>
                   </a:txBody>
@@ -9452,24 +7629,29 @@
                     <a:bodyPr/>
                     <a:lstStyle/>
                     <a:p>
+                      <a:pPr marL="0" marR="0" lvl="0" indent="0" algn="l" defTabSz="914400" rtl="0" eaLnBrk="1" fontAlgn="auto" latinLnBrk="0" hangingPunct="1">
+                        <a:lnSpc>
+                          <a:spcPct val="100000"/>
+                        </a:lnSpc>
+                        <a:spcBef>
+                          <a:spcPts val="0"/>
+                        </a:spcBef>
+                        <a:spcAft>
+                          <a:spcPts val="0"/>
+                        </a:spcAft>
+                        <a:buClr>
+                          <a:srgbClr val="000000"/>
+                        </a:buClr>
+                        <a:buSzTx/>
+                        <a:buFont typeface="Arial"/>
+                        <a:buNone/>
+                        <a:tabLst/>
+                        <a:defRPr/>
+                      </a:pPr>
                       <a:r>
-                        <a:rPr lang="es-PE" sz="1000" b="0" u="none" strike="noStrike" cap="none" dirty="0">
-                          <a:solidFill>
-                            <a:srgbClr val="000000"/>
-                          </a:solidFill>
-                          <a:latin typeface="Arial Narrow" panose="020B0606020202030204" pitchFamily="34" charset="0"/>
-                          <a:sym typeface="Arial"/>
-                        </a:rPr>
+                        <a:rPr lang="es-PE" sz="800" b="0" dirty="0"/>
                         <a:t>Idea</a:t>
                       </a:r>
-                      <a:endParaRPr lang="es-PE" sz="1000" b="0" i="0" u="none" strike="noStrike" cap="none" dirty="0">
-                        <a:solidFill>
-                          <a:srgbClr val="000000"/>
-                        </a:solidFill>
-                        <a:latin typeface="Arial Narrow" panose="020B0606020202030204" pitchFamily="34" charset="0"/>
-                        <a:cs typeface="Arial"/>
-                        <a:sym typeface="Arial"/>
-                      </a:endParaRPr>
                     </a:p>
                   </a:txBody>
                   <a:tcPr/>
@@ -9479,16 +7661,28 @@
                     <a:bodyPr/>
                     <a:lstStyle/>
                     <a:p>
+                      <a:pPr marL="0" marR="0" lvl="0" indent="0" algn="l" defTabSz="914400" rtl="0" eaLnBrk="1" fontAlgn="auto" latinLnBrk="0" hangingPunct="1">
+                        <a:lnSpc>
+                          <a:spcPct val="100000"/>
+                        </a:lnSpc>
+                        <a:spcBef>
+                          <a:spcPts val="0"/>
+                        </a:spcBef>
+                        <a:spcAft>
+                          <a:spcPts val="0"/>
+                        </a:spcAft>
+                        <a:buClr>
+                          <a:srgbClr val="000000"/>
+                        </a:buClr>
+                        <a:buSzTx/>
+                        <a:buFont typeface="Arial"/>
+                        <a:buNone/>
+                        <a:tabLst/>
+                        <a:defRPr/>
+                      </a:pPr>
                       <a:r>
-                        <a:rPr lang="es-PE" sz="1000" b="0" i="0" u="none" strike="noStrike" cap="none" dirty="0">
-                          <a:solidFill>
-                            <a:srgbClr val="000000"/>
-                          </a:solidFill>
-                          <a:latin typeface="Arial Narrow" panose="020B0606020202030204" pitchFamily="34" charset="0"/>
-                          <a:cs typeface="Arial"/>
-                          <a:sym typeface="Arial"/>
-                        </a:rPr>
-                        <a:t>3 meses</a:t>
+                        <a:rPr lang="es-PE" sz="800" b="0" dirty="0"/>
+                        <a:t>4 meses</a:t>
                       </a:r>
                     </a:p>
                   </a:txBody>
@@ -9519,64 +7713,8 @@
                         <a:defRPr/>
                       </a:pPr>
                       <a:r>
-                        <a:rPr lang="es-PE" sz="1000" b="0" dirty="0">
-                          <a:latin typeface="Arial Narrow" panose="020B0606020202030204" pitchFamily="34" charset="0"/>
-                        </a:rPr>
-                        <a:t>04 II.EE.</a:t>
-                      </a:r>
-                    </a:p>
-                    <a:p>
-                      <a:pPr marL="171450" marR="0" lvl="0" indent="-171450" algn="l" defTabSz="914400" rtl="0" eaLnBrk="1" fontAlgn="auto" latinLnBrk="0" hangingPunct="1">
-                        <a:lnSpc>
-                          <a:spcPct val="100000"/>
-                        </a:lnSpc>
-                        <a:spcBef>
-                          <a:spcPts val="0"/>
-                        </a:spcBef>
-                        <a:spcAft>
-                          <a:spcPts val="0"/>
-                        </a:spcAft>
-                        <a:buClr>
-                          <a:srgbClr val="000000"/>
-                        </a:buClr>
-                        <a:buSzTx/>
-                        <a:buFont typeface="Arial" panose="020B0604020202020204" pitchFamily="34" charset="0"/>
-                        <a:buChar char="•"/>
-                        <a:tabLst/>
-                        <a:defRPr/>
-                      </a:pPr>
-                      <a:r>
-                        <a:rPr lang="es-PE" sz="1000" b="0" dirty="0">
-                          <a:latin typeface="Arial Narrow" panose="020B0606020202030204" pitchFamily="34" charset="0"/>
-                        </a:rPr>
-                        <a:t>144 Alumnos</a:t>
-                      </a:r>
-                    </a:p>
-                    <a:p>
-                      <a:pPr marL="171450" marR="0" lvl="0" indent="-171450" algn="l" defTabSz="914400" rtl="0" eaLnBrk="1" fontAlgn="auto" latinLnBrk="0" hangingPunct="1">
-                        <a:lnSpc>
-                          <a:spcPct val="100000"/>
-                        </a:lnSpc>
-                        <a:spcBef>
-                          <a:spcPts val="0"/>
-                        </a:spcBef>
-                        <a:spcAft>
-                          <a:spcPts val="0"/>
-                        </a:spcAft>
-                        <a:buClr>
-                          <a:srgbClr val="000000"/>
-                        </a:buClr>
-                        <a:buSzTx/>
-                        <a:buFont typeface="Arial" panose="020B0604020202020204" pitchFamily="34" charset="0"/>
-                        <a:buChar char="•"/>
-                        <a:tabLst/>
-                        <a:defRPr/>
-                      </a:pPr>
-                      <a:r>
-                        <a:rPr lang="es-PE" sz="1000" b="0" dirty="0">
-                          <a:latin typeface="Arial Narrow" panose="020B0606020202030204" pitchFamily="34" charset="0"/>
-                        </a:rPr>
-                        <a:t>TDR en revisión</a:t>
+                        <a:rPr lang="es-PE" sz="800" b="0" dirty="0"/>
+                        <a:t>05 Casas Refugio</a:t>
                       </a:r>
                     </a:p>
                   </a:txBody>
@@ -9597,21 +7735,46 @@
                         <a:spcAft>
                           <a:spcPts val="0"/>
                         </a:spcAft>
-                        <a:buClr>
-                          <a:srgbClr val="000000"/>
-                        </a:buClr>
+                        <a:buClrTx/>
                         <a:buSzTx/>
-                        <a:buFont typeface="Arial" panose="020B0604020202020204" pitchFamily="34" charset="0"/>
+                        <a:buFontTx/>
                         <a:buNone/>
                         <a:tabLst/>
                         <a:defRPr/>
                       </a:pPr>
                       <a:r>
-                        <a:rPr lang="es-PE" sz="1000" b="0" dirty="0">
-                          <a:latin typeface="Arial Narrow" panose="020B0606020202030204" pitchFamily="34" charset="0"/>
+                        <a:rPr kumimoji="0" lang="es-PE" sz="800" b="0" i="0" u="none" strike="noStrike" kern="1200" cap="none" spc="0" normalizeH="0" baseline="0" noProof="0">
+                          <a:ln>
+                            <a:noFill/>
+                          </a:ln>
+                          <a:solidFill>
+                            <a:srgbClr val="000000"/>
+                          </a:solidFill>
+                          <a:effectLst/>
+                          <a:uLnTx/>
+                          <a:uFillTx/>
+                          <a:latin typeface="Calibri" panose="020F0502020204030204"/>
+                          <a:ea typeface="+mn-ea"/>
+                          <a:cs typeface="Arial"/>
+                          <a:sym typeface="Arial"/>
                         </a:rPr>
-                        <a:t>Contrata</a:t>
+                        <a:t>Por definir</a:t>
                       </a:r>
+                      <a:endParaRPr kumimoji="0" lang="es-PE" sz="800" b="0" i="0" u="none" strike="noStrike" kern="1200" cap="none" spc="0" normalizeH="0" baseline="0" noProof="0" dirty="0">
+                        <a:ln>
+                          <a:noFill/>
+                        </a:ln>
+                        <a:solidFill>
+                          <a:srgbClr val="000000"/>
+                        </a:solidFill>
+                        <a:effectLst/>
+                        <a:uLnTx/>
+                        <a:uFillTx/>
+                        <a:latin typeface="Calibri" panose="020F0502020204030204"/>
+                        <a:ea typeface="+mn-ea"/>
+                        <a:cs typeface="Arial"/>
+                        <a:sym typeface="Arial"/>
+                      </a:endParaRPr>
                     </a:p>
                   </a:txBody>
                   <a:tcPr/>
@@ -9644,23 +7807,16 @@
                         <a:buFont typeface="Arial"/>
                       </a:pPr>
                       <a:r>
-                        <a:rPr lang="es-PE" sz="1000" b="0" u="none" strike="noStrike" cap="none" dirty="0">
+                        <a:rPr lang="es-PE" sz="1000" b="0" i="0" u="none" strike="noStrike" cap="none" dirty="0">
                           <a:solidFill>
                             <a:srgbClr val="000000"/>
                           </a:solidFill>
                           <a:latin typeface="Arial Narrow" panose="020B0606020202030204" pitchFamily="34" charset="0"/>
+                          <a:cs typeface="Arial"/>
                           <a:sym typeface="Arial"/>
                         </a:rPr>
                         <a:t>5</a:t>
                       </a:r>
-                      <a:endParaRPr lang="es-PE" sz="1000" b="0" i="0" u="none" strike="noStrike" cap="none" dirty="0">
-                        <a:solidFill>
-                          <a:srgbClr val="000000"/>
-                        </a:solidFill>
-                        <a:latin typeface="Arial Narrow" panose="020B0606020202030204" pitchFamily="34" charset="0"/>
-                        <a:cs typeface="Arial"/>
-                        <a:sym typeface="Arial"/>
-                      </a:endParaRPr>
                     </a:p>
                   </a:txBody>
                   <a:tcPr/>
@@ -9670,36 +7826,17 @@
                     <a:bodyPr/>
                     <a:lstStyle/>
                     <a:p>
-                      <a:pPr marL="0" marR="0" lvl="0" indent="0" algn="ctr" defTabSz="914400" rtl="0" eaLnBrk="1" fontAlgn="ctr" latinLnBrk="0" hangingPunct="1">
-                        <a:lnSpc>
-                          <a:spcPct val="100000"/>
-                        </a:lnSpc>
-                        <a:spcBef>
-                          <a:spcPts val="0"/>
-                        </a:spcBef>
-                        <a:spcAft>
-                          <a:spcPts val="0"/>
-                        </a:spcAft>
-                        <a:buClrTx/>
-                        <a:buSzTx/>
-                        <a:buFontTx/>
-                        <a:buNone/>
-                        <a:tabLst/>
-                        <a:defRPr/>
-                      </a:pPr>
+                      <a:pPr algn="ctr" rtl="0" fontAlgn="ctr"/>
                       <a:r>
-                        <a:rPr lang="es-PE" sz="1000" b="0" i="0" u="none" strike="noStrike" dirty="0">
+                        <a:rPr lang="es-PE" sz="1000" b="0" i="0" u="none" strike="noStrike">
                           <a:solidFill>
                             <a:srgbClr val="000000"/>
                           </a:solidFill>
                           <a:effectLst/>
                           <a:latin typeface="Arial Narrow" panose="020B0606020202030204" pitchFamily="34" charset="0"/>
                         </a:rPr>
-                        <a:t>----</a:t>
+                        <a:t>91133</a:t>
                       </a:r>
-                    </a:p>
-                    <a:p>
-                      <a:pPr algn="ctr" rtl="0" fontAlgn="ctr"/>
                       <a:endParaRPr lang="es-PE" sz="1000" b="0" i="0" u="none" strike="noStrike" dirty="0">
                         <a:solidFill>
                           <a:srgbClr val="000000"/>
@@ -9716,104 +7853,20 @@
                     <a:bodyPr/>
                     <a:lstStyle/>
                     <a:p>
-                      <a:pPr algn="ctr" rtl="0" fontAlgn="ctr"/>
                       <a:r>
-                        <a:rPr lang="es-PE" sz="1000" b="0" i="0" u="none" strike="noStrike" dirty="0">
+                        <a:rPr lang="es-PE" sz="800" b="0" u="none" strike="noStrike" cap="none" dirty="0">
                           <a:solidFill>
                             <a:srgbClr val="000000"/>
                           </a:solidFill>
-                          <a:effectLst/>
-                          <a:latin typeface="Arial Narrow" panose="020B0606020202030204" pitchFamily="34" charset="0"/>
+                          <a:sym typeface="Arial"/>
                         </a:rPr>
-                        <a:t>108798</a:t>
+                        <a:t>MEJORAMIENTO DEL TEMPLO DE SAN PEDRO DE LLICCHIVILCA DEL DISTRITO DE GAMARRA - PROVINCIA DE GRAU - DEPARTAMENTO DE APURIMAC</a:t>
                       </a:r>
-                    </a:p>
-                  </a:txBody>
-                  <a:tcPr marL="6772" marR="6772" marT="6772" marB="0" anchor="ctr"/>
-                </a:tc>
-                <a:tc>
-                  <a:txBody>
-                    <a:bodyPr/>
-                    <a:lstStyle/>
-                    <a:p>
-                      <a:pPr marL="0" marR="0" lvl="0" indent="0" algn="l" defTabSz="914400" rtl="0" eaLnBrk="1" fontAlgn="ctr" latinLnBrk="0" hangingPunct="1">
-                        <a:lnSpc>
-                          <a:spcPct val="100000"/>
-                        </a:lnSpc>
-                        <a:spcBef>
-                          <a:spcPts val="0"/>
-                        </a:spcBef>
-                        <a:spcAft>
-                          <a:spcPts val="0"/>
-                        </a:spcAft>
-                        <a:buClrTx/>
-                        <a:buSzTx/>
-                        <a:buFontTx/>
-                        <a:buNone/>
-                        <a:tabLst/>
-                        <a:defRPr/>
-                      </a:pPr>
-                      <a:r>
-                        <a:rPr lang="es-PE" sz="1000" b="0" i="0" u="none" strike="noStrike" dirty="0" err="1">
-                          <a:solidFill>
-                            <a:srgbClr val="000000"/>
-                          </a:solidFill>
-                          <a:effectLst/>
-                          <a:highlight>
-                            <a:srgbClr val="FF0000"/>
-                          </a:highlight>
-                          <a:latin typeface="Arial Narrow" panose="020B0606020202030204" pitchFamily="34" charset="0"/>
-                        </a:rPr>
-                        <a:t>Educacion</a:t>
-                      </a:r>
-                      <a:endParaRPr lang="es-PE" sz="1000" b="0" i="0" u="none" strike="noStrike" dirty="0">
+                      <a:endParaRPr lang="es-PE" sz="800" b="0" i="0" u="none" strike="noStrike" cap="none" dirty="0">
                         <a:solidFill>
                           <a:srgbClr val="000000"/>
                         </a:solidFill>
-                        <a:effectLst/>
-                        <a:highlight>
-                          <a:srgbClr val="FF0000"/>
-                        </a:highlight>
-                        <a:latin typeface="Arial Narrow" panose="020B0606020202030204" pitchFamily="34" charset="0"/>
-                      </a:endParaRPr>
-                    </a:p>
-                    <a:p>
-                      <a:pPr algn="l" rtl="0" fontAlgn="ctr"/>
-                      <a:endParaRPr lang="es-PE" sz="1000" b="0" i="0" u="none" strike="noStrike" dirty="0">
-                        <a:solidFill>
-                          <a:srgbClr val="000000"/>
-                        </a:solidFill>
-                        <a:effectLst/>
-                        <a:highlight>
-                          <a:srgbClr val="FF0000"/>
-                        </a:highlight>
-                        <a:latin typeface="Arial Narrow" panose="020B0606020202030204" pitchFamily="34" charset="0"/>
-                      </a:endParaRPr>
-                    </a:p>
-                  </a:txBody>
-                  <a:tcPr marL="6772" marR="6772" marT="6772" marB="0" anchor="ctr"/>
-                </a:tc>
-                <a:tc>
-                  <a:txBody>
-                    <a:bodyPr/>
-                    <a:lstStyle/>
-                    <a:p>
-                      <a:r>
-                        <a:rPr lang="es-PE" sz="1000" b="0" u="none" strike="noStrike" cap="none" dirty="0">
-                          <a:solidFill>
-                            <a:srgbClr val="000000"/>
-                          </a:solidFill>
-                          <a:latin typeface="Arial Narrow" panose="020B0606020202030204" pitchFamily="34" charset="0"/>
-                          <a:sym typeface="Arial"/>
-                          <a:hlinkClick r:id="" action="ppaction://noaction"/>
-                        </a:rPr>
-                        <a:t>MEJORAMIENTO DEL SERVICIO EDUCATIVO DEL NIVEL INICIAL N°1005 BARRIO CENTRO DE COTABAMBAS, N°1024 CHECCHECALLA DE TAMBOBAMBA,N°716 DIVINO NIÑO JESUS DE HAQUIRA Y N°1008 CHOCHOCA DE COYLLURQUI, PROVINCIA DE COTABAMBAS, REGION APURIMAC</a:t>
-                      </a:r>
-                      <a:endParaRPr lang="es-PE" sz="1000" b="0" i="0" u="none" strike="noStrike" cap="none" dirty="0">
-                        <a:solidFill>
-                          <a:srgbClr val="000000"/>
-                        </a:solidFill>
-                        <a:latin typeface="Arial Narrow" panose="020B0606020202030204" pitchFamily="34" charset="0"/>
+                        <a:latin typeface="Arial"/>
                         <a:cs typeface="Arial"/>
                         <a:sym typeface="Arial"/>
                       </a:endParaRPr>
@@ -9827,43 +7880,16 @@
                     <a:lstStyle/>
                     <a:p>
                       <a:r>
-                        <a:rPr lang="es-PE" sz="1000" b="0" i="0" u="none" strike="noStrike" cap="none" dirty="0">
+                        <a:rPr lang="es-PE" sz="800" b="0" i="0" u="none" strike="noStrike" cap="none" dirty="0">
                           <a:solidFill>
                             <a:srgbClr val="000000"/>
                           </a:solidFill>
-                          <a:latin typeface="Arial Narrow" panose="020B0606020202030204" pitchFamily="34" charset="0"/>
+                          <a:latin typeface="Arial"/>
                           <a:cs typeface="Arial"/>
                           <a:sym typeface="Arial"/>
                         </a:rPr>
-                        <a:t> 9,220,000.00 	</a:t>
+                        <a:t>706,600.00</a:t>
                       </a:r>
-                    </a:p>
-                  </a:txBody>
-                  <a:tcPr/>
-                </a:tc>
-                <a:tc>
-                  <a:txBody>
-                    <a:bodyPr/>
-                    <a:lstStyle/>
-                    <a:p>
-                      <a:r>
-                        <a:rPr lang="es-PE" sz="1000" b="0" u="none" strike="noStrike" cap="none" dirty="0">
-                          <a:solidFill>
-                            <a:srgbClr val="000000"/>
-                          </a:solidFill>
-                          <a:latin typeface="Arial Narrow" panose="020B0606020202030204" pitchFamily="34" charset="0"/>
-                          <a:sym typeface="Arial"/>
-                        </a:rPr>
-                        <a:t>Idea</a:t>
-                      </a:r>
-                      <a:endParaRPr lang="es-PE" sz="1000" b="0" i="0" u="none" strike="noStrike" cap="none" dirty="0">
-                        <a:solidFill>
-                          <a:srgbClr val="000000"/>
-                        </a:solidFill>
-                        <a:latin typeface="Arial Narrow" panose="020B0606020202030204" pitchFamily="34" charset="0"/>
-                        <a:cs typeface="Arial"/>
-                        <a:sym typeface="Arial"/>
-                      </a:endParaRPr>
                     </a:p>
                   </a:txBody>
                   <a:tcPr/>
@@ -9893,103 +7919,8 @@
                         <a:defRPr/>
                       </a:pPr>
                       <a:r>
-                        <a:rPr lang="es-PE" sz="1000" b="0" i="0" u="none" strike="noStrike" cap="none" dirty="0">
-                          <a:solidFill>
-                            <a:srgbClr val="000000"/>
-                          </a:solidFill>
-                          <a:latin typeface="Arial Narrow" panose="020B0606020202030204" pitchFamily="34" charset="0"/>
-                          <a:cs typeface="Arial"/>
-                          <a:sym typeface="Arial"/>
-                        </a:rPr>
-                        <a:t>3 meses</a:t>
-                      </a:r>
-                    </a:p>
-                  </a:txBody>
-                  <a:tcPr/>
-                </a:tc>
-                <a:tc>
-                  <a:txBody>
-                    <a:bodyPr/>
-                    <a:lstStyle/>
-                    <a:p>
-                      <a:pPr marL="171450" marR="0" lvl="0" indent="-171450" algn="l" defTabSz="914400" rtl="0" eaLnBrk="1" fontAlgn="auto" latinLnBrk="0" hangingPunct="1">
-                        <a:lnSpc>
-                          <a:spcPct val="100000"/>
-                        </a:lnSpc>
-                        <a:spcBef>
-                          <a:spcPts val="0"/>
-                        </a:spcBef>
-                        <a:spcAft>
-                          <a:spcPts val="0"/>
-                        </a:spcAft>
-                        <a:buClr>
-                          <a:srgbClr val="000000"/>
-                        </a:buClr>
-                        <a:buSzTx/>
-                        <a:buFont typeface="Arial" panose="020B0604020202020204" pitchFamily="34" charset="0"/>
-                        <a:buChar char="•"/>
-                        <a:tabLst/>
-                        <a:defRPr/>
-                      </a:pPr>
-                      <a:r>
-                        <a:rPr lang="es-PE" sz="1000" b="0" dirty="0">
-                          <a:latin typeface="Arial Narrow" panose="020B0606020202030204" pitchFamily="34" charset="0"/>
-                        </a:rPr>
-                        <a:t>04 II.EE.</a:t>
-                      </a:r>
-                    </a:p>
-                    <a:p>
-                      <a:pPr marL="171450" marR="0" lvl="0" indent="-171450" algn="l" defTabSz="914400" rtl="0" eaLnBrk="1" fontAlgn="auto" latinLnBrk="0" hangingPunct="1">
-                        <a:lnSpc>
-                          <a:spcPct val="100000"/>
-                        </a:lnSpc>
-                        <a:spcBef>
-                          <a:spcPts val="0"/>
-                        </a:spcBef>
-                        <a:spcAft>
-                          <a:spcPts val="0"/>
-                        </a:spcAft>
-                        <a:buClr>
-                          <a:srgbClr val="000000"/>
-                        </a:buClr>
-                        <a:buSzTx/>
-                        <a:buFont typeface="Arial" panose="020B0604020202020204" pitchFamily="34" charset="0"/>
-                        <a:buChar char="•"/>
-                        <a:tabLst/>
-                        <a:defRPr/>
-                      </a:pPr>
-                      <a:r>
-                        <a:rPr lang="es-PE" sz="1000" b="0" dirty="0">
-                          <a:latin typeface="Arial Narrow" panose="020B0606020202030204" pitchFamily="34" charset="0"/>
-                        </a:rPr>
-                        <a:t>105 Alumnos</a:t>
-                      </a:r>
-                    </a:p>
-                    <a:p>
-                      <a:pPr marL="171450" marR="0" lvl="0" indent="-171450" algn="l" defTabSz="914400" rtl="0" eaLnBrk="1" fontAlgn="auto" latinLnBrk="0" hangingPunct="1">
-                        <a:lnSpc>
-                          <a:spcPct val="100000"/>
-                        </a:lnSpc>
-                        <a:spcBef>
-                          <a:spcPts val="0"/>
-                        </a:spcBef>
-                        <a:spcAft>
-                          <a:spcPts val="0"/>
-                        </a:spcAft>
-                        <a:buClr>
-                          <a:srgbClr val="000000"/>
-                        </a:buClr>
-                        <a:buSzTx/>
-                        <a:buFont typeface="Arial" panose="020B0604020202020204" pitchFamily="34" charset="0"/>
-                        <a:buChar char="•"/>
-                        <a:tabLst/>
-                        <a:defRPr/>
-                      </a:pPr>
-                      <a:r>
-                        <a:rPr lang="es-PE" sz="1000" b="0" dirty="0">
-                          <a:latin typeface="Arial Narrow" panose="020B0606020202030204" pitchFamily="34" charset="0"/>
-                        </a:rPr>
-                        <a:t>TDR en revisión</a:t>
+                        <a:rPr lang="es-PE" sz="800" b="0" dirty="0"/>
+                        <a:t>Idea</a:t>
                       </a:r>
                     </a:p>
                   </a:txBody>
@@ -10001,19 +7932,77 @@
                     <a:lstStyle/>
                     <a:p>
                       <a:r>
-                        <a:rPr lang="es-PE" sz="1000" b="0" dirty="0">
-                          <a:latin typeface="Arial Narrow" panose="020B0606020202030204" pitchFamily="34" charset="0"/>
+                        <a:rPr lang="es-PE" sz="800" b="0" i="0" u="none" strike="noStrike" cap="none" dirty="0">
+                          <a:solidFill>
+                            <a:srgbClr val="000000"/>
+                          </a:solidFill>
+                          <a:latin typeface="Arial"/>
+                          <a:cs typeface="Arial"/>
+                          <a:sym typeface="Arial"/>
                         </a:rPr>
-                        <a:t>Contrata</a:t>
+                        <a:t>2 meses</a:t>
                       </a:r>
-                      <a:endParaRPr lang="es-PE" sz="1000" b="0" i="0" u="none" strike="noStrike" cap="none" dirty="0">
+                    </a:p>
+                  </a:txBody>
+                  <a:tcPr/>
+                </a:tc>
+                <a:tc>
+                  <a:txBody>
+                    <a:bodyPr/>
+                    <a:lstStyle/>
+                    <a:p>
+                      <a:endParaRPr lang="es-PE" sz="800" b="0" i="0" u="none" strike="noStrike" cap="none" dirty="0">
                         <a:solidFill>
                           <a:srgbClr val="000000"/>
                         </a:solidFill>
-                        <a:latin typeface="Arial Narrow" panose="020B0606020202030204" pitchFamily="34" charset="0"/>
+                        <a:latin typeface="Arial"/>
                         <a:cs typeface="Arial"/>
                         <a:sym typeface="Arial"/>
                       </a:endParaRPr>
+                    </a:p>
+                  </a:txBody>
+                  <a:tcPr/>
+                </a:tc>
+                <a:tc>
+                  <a:txBody>
+                    <a:bodyPr/>
+                    <a:lstStyle/>
+                    <a:p>
+                      <a:pPr marL="0" marR="0" lvl="0" indent="0" algn="l" defTabSz="914400" rtl="0" eaLnBrk="1" fontAlgn="auto" latinLnBrk="0" hangingPunct="1">
+                        <a:lnSpc>
+                          <a:spcPct val="100000"/>
+                        </a:lnSpc>
+                        <a:spcBef>
+                          <a:spcPts val="0"/>
+                        </a:spcBef>
+                        <a:spcAft>
+                          <a:spcPts val="0"/>
+                        </a:spcAft>
+                        <a:buClrTx/>
+                        <a:buSzTx/>
+                        <a:buFontTx/>
+                        <a:buNone/>
+                        <a:tabLst/>
+                        <a:defRPr/>
+                      </a:pPr>
+                      <a:r>
+                        <a:rPr kumimoji="0" lang="es-PE" sz="800" b="0" i="0" u="none" strike="noStrike" kern="1200" cap="none" spc="0" normalizeH="0" baseline="0" noProof="0" dirty="0">
+                          <a:ln>
+                            <a:noFill/>
+                          </a:ln>
+                          <a:solidFill>
+                            <a:srgbClr val="000000"/>
+                          </a:solidFill>
+                          <a:effectLst/>
+                          <a:uLnTx/>
+                          <a:uFillTx/>
+                          <a:latin typeface="Calibri" panose="020F0502020204030204"/>
+                          <a:ea typeface="+mn-ea"/>
+                          <a:cs typeface="Arial"/>
+                          <a:sym typeface="Arial"/>
+                        </a:rPr>
+                        <a:t>Por definir</a:t>
+                      </a:r>
                     </a:p>
                   </a:txBody>
                   <a:tcPr/>
@@ -10030,10 +8019,10 @@
       </p:graphicFrame>
       <p:sp>
         <p:nvSpPr>
-          <p:cNvPr id="2" name="Google Shape;95;p13">
+          <p:cNvPr id="5" name="Google Shape;95;p13">
             <a:extLst>
               <a:ext uri="{FF2B5EF4-FFF2-40B4-BE49-F238E27FC236}">
-                <a16:creationId xmlns:a16="http://schemas.microsoft.com/office/drawing/2014/main" id="{FBE539B5-308D-4571-85FB-CD2CBA488342}"/>
+                <a16:creationId xmlns:a16="http://schemas.microsoft.com/office/drawing/2014/main" id="{87C33BF4-859E-4FE4-855D-7AE0066FDAE3}"/>
               </a:ext>
             </a:extLst>
           </p:cNvPr>
@@ -10044,8 +8033,8 @@
         </p:nvSpPr>
         <p:spPr>
           <a:xfrm>
-            <a:off x="3968767" y="699108"/>
-            <a:ext cx="3841697" cy="602007"/>
+            <a:off x="493014" y="730784"/>
+            <a:ext cx="10051530" cy="473801"/>
           </a:xfrm>
           <a:prstGeom prst="rect">
             <a:avLst/>
@@ -10338,7 +8327,7 @@
                 <a:ea typeface="+mj-ea"/>
                 <a:cs typeface="+mj-cs"/>
               </a:rPr>
-              <a:t>Función EDUCACION</a:t>
+              <a:t>Función CULTURA Y DEPORTE, FUNCION PROTECCION SOCIAL</a:t>
             </a:r>
           </a:p>
         </p:txBody>

</xml_diff>